<commit_message>
update document (structural design v0.3)
</commit_message>
<xml_diff>
--- a/ViT_docs/문서작성용_그림원본.pptx
+++ b/ViT_docs/문서작성용_그림원본.pptx
@@ -6,6 +6,10 @@
   </p:sldMasterIdLst>
   <p:sldIdLst>
     <p:sldId id="256" r:id="rId2"/>
+    <p:sldId id="257" r:id="rId3"/>
+    <p:sldId id="258" r:id="rId4"/>
+    <p:sldId id="259" r:id="rId5"/>
+    <p:sldId id="260" r:id="rId6"/>
   </p:sldIdLst>
   <p:sldSz cx="12192000" cy="6858000"/>
   <p:notesSz cx="6858000" cy="9144000"/>
@@ -259,7 +263,7 @@
           <a:p>
             <a:fld id="{C45A1C21-134E-40EB-8D47-CF3E42B81BA3}" type="datetimeFigureOut">
               <a:rPr lang="ko-KR" altLang="en-US" smtClean="0"/>
-              <a:t>2021-10-27</a:t>
+              <a:t>2021-12-09</a:t>
             </a:fld>
             <a:endParaRPr lang="ko-KR" altLang="en-US"/>
           </a:p>
@@ -457,7 +461,7 @@
           <a:p>
             <a:fld id="{C45A1C21-134E-40EB-8D47-CF3E42B81BA3}" type="datetimeFigureOut">
               <a:rPr lang="ko-KR" altLang="en-US" smtClean="0"/>
-              <a:t>2021-10-27</a:t>
+              <a:t>2021-12-09</a:t>
             </a:fld>
             <a:endParaRPr lang="ko-KR" altLang="en-US"/>
           </a:p>
@@ -665,7 +669,7 @@
           <a:p>
             <a:fld id="{C45A1C21-134E-40EB-8D47-CF3E42B81BA3}" type="datetimeFigureOut">
               <a:rPr lang="ko-KR" altLang="en-US" smtClean="0"/>
-              <a:t>2021-10-27</a:t>
+              <a:t>2021-12-09</a:t>
             </a:fld>
             <a:endParaRPr lang="ko-KR" altLang="en-US"/>
           </a:p>
@@ -863,7 +867,7 @@
           <a:p>
             <a:fld id="{C45A1C21-134E-40EB-8D47-CF3E42B81BA3}" type="datetimeFigureOut">
               <a:rPr lang="ko-KR" altLang="en-US" smtClean="0"/>
-              <a:t>2021-10-27</a:t>
+              <a:t>2021-12-09</a:t>
             </a:fld>
             <a:endParaRPr lang="ko-KR" altLang="en-US"/>
           </a:p>
@@ -1138,7 +1142,7 @@
           <a:p>
             <a:fld id="{C45A1C21-134E-40EB-8D47-CF3E42B81BA3}" type="datetimeFigureOut">
               <a:rPr lang="ko-KR" altLang="en-US" smtClean="0"/>
-              <a:t>2021-10-27</a:t>
+              <a:t>2021-12-09</a:t>
             </a:fld>
             <a:endParaRPr lang="ko-KR" altLang="en-US"/>
           </a:p>
@@ -1403,7 +1407,7 @@
           <a:p>
             <a:fld id="{C45A1C21-134E-40EB-8D47-CF3E42B81BA3}" type="datetimeFigureOut">
               <a:rPr lang="ko-KR" altLang="en-US" smtClean="0"/>
-              <a:t>2021-10-27</a:t>
+              <a:t>2021-12-09</a:t>
             </a:fld>
             <a:endParaRPr lang="ko-KR" altLang="en-US"/>
           </a:p>
@@ -1815,7 +1819,7 @@
           <a:p>
             <a:fld id="{C45A1C21-134E-40EB-8D47-CF3E42B81BA3}" type="datetimeFigureOut">
               <a:rPr lang="ko-KR" altLang="en-US" smtClean="0"/>
-              <a:t>2021-10-27</a:t>
+              <a:t>2021-12-09</a:t>
             </a:fld>
             <a:endParaRPr lang="ko-KR" altLang="en-US"/>
           </a:p>
@@ -1956,7 +1960,7 @@
           <a:p>
             <a:fld id="{C45A1C21-134E-40EB-8D47-CF3E42B81BA3}" type="datetimeFigureOut">
               <a:rPr lang="ko-KR" altLang="en-US" smtClean="0"/>
-              <a:t>2021-10-27</a:t>
+              <a:t>2021-12-09</a:t>
             </a:fld>
             <a:endParaRPr lang="ko-KR" altLang="en-US"/>
           </a:p>
@@ -2069,7 +2073,7 @@
           <a:p>
             <a:fld id="{C45A1C21-134E-40EB-8D47-CF3E42B81BA3}" type="datetimeFigureOut">
               <a:rPr lang="ko-KR" altLang="en-US" smtClean="0"/>
-              <a:t>2021-10-27</a:t>
+              <a:t>2021-12-09</a:t>
             </a:fld>
             <a:endParaRPr lang="ko-KR" altLang="en-US"/>
           </a:p>
@@ -2380,7 +2384,7 @@
           <a:p>
             <a:fld id="{C45A1C21-134E-40EB-8D47-CF3E42B81BA3}" type="datetimeFigureOut">
               <a:rPr lang="ko-KR" altLang="en-US" smtClean="0"/>
-              <a:t>2021-10-27</a:t>
+              <a:t>2021-12-09</a:t>
             </a:fld>
             <a:endParaRPr lang="ko-KR" altLang="en-US"/>
           </a:p>
@@ -2668,7 +2672,7 @@
           <a:p>
             <a:fld id="{C45A1C21-134E-40EB-8D47-CF3E42B81BA3}" type="datetimeFigureOut">
               <a:rPr lang="ko-KR" altLang="en-US" smtClean="0"/>
-              <a:t>2021-10-27</a:t>
+              <a:t>2021-12-09</a:t>
             </a:fld>
             <a:endParaRPr lang="ko-KR" altLang="en-US"/>
           </a:p>
@@ -2909,7 +2913,7 @@
           <a:p>
             <a:fld id="{C45A1C21-134E-40EB-8D47-CF3E42B81BA3}" type="datetimeFigureOut">
               <a:rPr lang="ko-KR" altLang="en-US" smtClean="0"/>
-              <a:t>2021-10-27</a:t>
+              <a:t>2021-12-09</a:t>
             </a:fld>
             <a:endParaRPr lang="ko-KR" altLang="en-US"/>
           </a:p>
@@ -5534,6 +5538,1381 @@
 </p:sld>
 </file>
 
+<file path=ppt/slides/slide2.xml><?xml version="1.0" encoding="utf-8"?>
+<p:sld xmlns:a="http://schemas.openxmlformats.org/drawingml/2006/main" xmlns:r="http://schemas.openxmlformats.org/officeDocument/2006/relationships" xmlns:p="http://schemas.openxmlformats.org/presentationml/2006/main">
+  <p:cSld>
+    <p:spTree>
+      <p:nvGrpSpPr>
+        <p:cNvPr id="1" name=""/>
+        <p:cNvGrpSpPr/>
+        <p:nvPr/>
+      </p:nvGrpSpPr>
+      <p:grpSpPr>
+        <a:xfrm>
+          <a:off x="0" y="0"/>
+          <a:ext cx="0" cy="0"/>
+          <a:chOff x="0" y="0"/>
+          <a:chExt cx="0" cy="0"/>
+        </a:xfrm>
+      </p:grpSpPr>
+      <p:sp>
+        <p:nvSpPr>
+          <p:cNvPr id="9" name="직사각형 8">
+            <a:extLst>
+              <a:ext uri="{FF2B5EF4-FFF2-40B4-BE49-F238E27FC236}">
+                <a16:creationId xmlns:a16="http://schemas.microsoft.com/office/drawing/2014/main" id="{33204D42-769B-4345-A235-69F2378115CA}"/>
+              </a:ext>
+            </a:extLst>
+          </p:cNvPr>
+          <p:cNvSpPr/>
+          <p:nvPr/>
+        </p:nvSpPr>
+        <p:spPr>
+          <a:xfrm>
+            <a:off x="606829" y="473825"/>
+            <a:ext cx="3241964" cy="656706"/>
+          </a:xfrm>
+          <a:prstGeom prst="rect">
+            <a:avLst/>
+          </a:prstGeom>
+        </p:spPr>
+        <p:style>
+          <a:lnRef idx="2">
+            <a:schemeClr val="accent1">
+              <a:shade val="50000"/>
+            </a:schemeClr>
+          </a:lnRef>
+          <a:fillRef idx="1">
+            <a:schemeClr val="accent1"/>
+          </a:fillRef>
+          <a:effectRef idx="0">
+            <a:schemeClr val="accent1"/>
+          </a:effectRef>
+          <a:fontRef idx="minor">
+            <a:schemeClr val="lt1"/>
+          </a:fontRef>
+        </p:style>
+        <p:txBody>
+          <a:bodyPr rtlCol="0" anchor="ctr"/>
+          <a:lstStyle/>
+          <a:p>
+            <a:pPr algn="ctr"/>
+            <a:r>
+              <a:rPr lang="ko-KR" altLang="en-US" sz="1200" dirty="0">
+                <a:latin typeface="나눔고딕" panose="020D0604000000000000" pitchFamily="50" charset="-127"/>
+                <a:ea typeface="나눔고딕" panose="020D0604000000000000" pitchFamily="50" charset="-127"/>
+              </a:rPr>
+              <a:t>연결 메뉴</a:t>
+            </a:r>
+          </a:p>
+        </p:txBody>
+      </p:sp>
+      <p:sp>
+        <p:nvSpPr>
+          <p:cNvPr id="41" name="직사각형 40">
+            <a:extLst>
+              <a:ext uri="{FF2B5EF4-FFF2-40B4-BE49-F238E27FC236}">
+                <a16:creationId xmlns:a16="http://schemas.microsoft.com/office/drawing/2014/main" id="{59C4B2C8-F040-4398-A545-5C8C0A411CD1}"/>
+              </a:ext>
+            </a:extLst>
+          </p:cNvPr>
+          <p:cNvSpPr/>
+          <p:nvPr/>
+        </p:nvSpPr>
+        <p:spPr>
+          <a:xfrm>
+            <a:off x="606829" y="1510144"/>
+            <a:ext cx="3241964" cy="656706"/>
+          </a:xfrm>
+          <a:prstGeom prst="rect">
+            <a:avLst/>
+          </a:prstGeom>
+        </p:spPr>
+        <p:style>
+          <a:lnRef idx="2">
+            <a:schemeClr val="accent1">
+              <a:shade val="50000"/>
+            </a:schemeClr>
+          </a:lnRef>
+          <a:fillRef idx="1">
+            <a:schemeClr val="accent1"/>
+          </a:fillRef>
+          <a:effectRef idx="0">
+            <a:schemeClr val="accent1"/>
+          </a:effectRef>
+          <a:fontRef idx="minor">
+            <a:schemeClr val="lt1"/>
+          </a:fontRef>
+        </p:style>
+        <p:txBody>
+          <a:bodyPr rtlCol="0" anchor="ctr"/>
+          <a:lstStyle/>
+          <a:p>
+            <a:pPr algn="ctr"/>
+            <a:r>
+              <a:rPr lang="ko-KR" altLang="en-US" sz="1200" dirty="0">
+                <a:latin typeface="나눔고딕" panose="020D0604000000000000" pitchFamily="50" charset="-127"/>
+                <a:ea typeface="나눔고딕" panose="020D0604000000000000" pitchFamily="50" charset="-127"/>
+              </a:rPr>
+              <a:t>연결 </a:t>
+            </a:r>
+            <a:r>
+              <a:rPr lang="en-US" altLang="ko-KR" sz="1200" dirty="0">
+                <a:latin typeface="나눔고딕" panose="020D0604000000000000" pitchFamily="50" charset="-127"/>
+                <a:ea typeface="나눔고딕" panose="020D0604000000000000" pitchFamily="50" charset="-127"/>
+              </a:rPr>
+              <a:t>Popup</a:t>
+            </a:r>
+            <a:endParaRPr lang="ko-KR" altLang="en-US" sz="1200" dirty="0">
+              <a:latin typeface="나눔고딕" panose="020D0604000000000000" pitchFamily="50" charset="-127"/>
+              <a:ea typeface="나눔고딕" panose="020D0604000000000000" pitchFamily="50" charset="-127"/>
+            </a:endParaRPr>
+          </a:p>
+        </p:txBody>
+      </p:sp>
+      <p:sp>
+        <p:nvSpPr>
+          <p:cNvPr id="42" name="직사각형 41">
+            <a:extLst>
+              <a:ext uri="{FF2B5EF4-FFF2-40B4-BE49-F238E27FC236}">
+                <a16:creationId xmlns:a16="http://schemas.microsoft.com/office/drawing/2014/main" id="{D9DB538D-374A-495A-8AA4-4A81EECA5CE8}"/>
+              </a:ext>
+            </a:extLst>
+          </p:cNvPr>
+          <p:cNvSpPr/>
+          <p:nvPr/>
+        </p:nvSpPr>
+        <p:spPr>
+          <a:xfrm>
+            <a:off x="606830" y="2565861"/>
+            <a:ext cx="964276" cy="656706"/>
+          </a:xfrm>
+          <a:prstGeom prst="rect">
+            <a:avLst/>
+          </a:prstGeom>
+        </p:spPr>
+        <p:style>
+          <a:lnRef idx="2">
+            <a:schemeClr val="accent1">
+              <a:shade val="50000"/>
+            </a:schemeClr>
+          </a:lnRef>
+          <a:fillRef idx="1">
+            <a:schemeClr val="accent1"/>
+          </a:fillRef>
+          <a:effectRef idx="0">
+            <a:schemeClr val="accent1"/>
+          </a:effectRef>
+          <a:fontRef idx="minor">
+            <a:schemeClr val="lt1"/>
+          </a:fontRef>
+        </p:style>
+        <p:txBody>
+          <a:bodyPr rtlCol="0" anchor="ctr"/>
+          <a:lstStyle/>
+          <a:p>
+            <a:pPr algn="ctr"/>
+            <a:r>
+              <a:rPr lang="ko-KR" altLang="en-US" sz="1200" dirty="0">
+                <a:latin typeface="나눔고딕" panose="020D0604000000000000" pitchFamily="50" charset="-127"/>
+                <a:ea typeface="나눔고딕" panose="020D0604000000000000" pitchFamily="50" charset="-127"/>
+              </a:rPr>
+              <a:t>연결 완료</a:t>
+            </a:r>
+          </a:p>
+        </p:txBody>
+      </p:sp>
+      <p:cxnSp>
+        <p:nvCxnSpPr>
+          <p:cNvPr id="11" name="직선 화살표 연결선 10">
+            <a:extLst>
+              <a:ext uri="{FF2B5EF4-FFF2-40B4-BE49-F238E27FC236}">
+                <a16:creationId xmlns:a16="http://schemas.microsoft.com/office/drawing/2014/main" id="{6D0E273C-CCAF-43D7-8743-E57EE3ACA297}"/>
+              </a:ext>
+            </a:extLst>
+          </p:cNvPr>
+          <p:cNvCxnSpPr>
+            <a:stCxn id="9" idx="2"/>
+            <a:endCxn id="41" idx="0"/>
+          </p:cNvCxnSpPr>
+          <p:nvPr/>
+        </p:nvCxnSpPr>
+        <p:spPr>
+          <a:xfrm>
+            <a:off x="2227811" y="1130531"/>
+            <a:ext cx="0" cy="379613"/>
+          </a:xfrm>
+          <a:prstGeom prst="straightConnector1">
+            <a:avLst/>
+          </a:prstGeom>
+          <a:ln>
+            <a:tailEnd type="triangle"/>
+          </a:ln>
+        </p:spPr>
+        <p:style>
+          <a:lnRef idx="1">
+            <a:schemeClr val="accent1"/>
+          </a:lnRef>
+          <a:fillRef idx="0">
+            <a:schemeClr val="accent1"/>
+          </a:fillRef>
+          <a:effectRef idx="0">
+            <a:schemeClr val="accent1"/>
+          </a:effectRef>
+          <a:fontRef idx="minor">
+            <a:schemeClr val="tx1"/>
+          </a:fontRef>
+        </p:style>
+      </p:cxnSp>
+      <p:sp>
+        <p:nvSpPr>
+          <p:cNvPr id="45" name="직사각형 44">
+            <a:extLst>
+              <a:ext uri="{FF2B5EF4-FFF2-40B4-BE49-F238E27FC236}">
+                <a16:creationId xmlns:a16="http://schemas.microsoft.com/office/drawing/2014/main" id="{32B3EF79-3791-4778-B253-9AD648A14042}"/>
+              </a:ext>
+            </a:extLst>
+          </p:cNvPr>
+          <p:cNvSpPr/>
+          <p:nvPr/>
+        </p:nvSpPr>
+        <p:spPr>
+          <a:xfrm>
+            <a:off x="2884518" y="2565861"/>
+            <a:ext cx="964276" cy="656706"/>
+          </a:xfrm>
+          <a:prstGeom prst="rect">
+            <a:avLst/>
+          </a:prstGeom>
+        </p:spPr>
+        <p:style>
+          <a:lnRef idx="2">
+            <a:schemeClr val="accent1">
+              <a:shade val="50000"/>
+            </a:schemeClr>
+          </a:lnRef>
+          <a:fillRef idx="1">
+            <a:schemeClr val="accent1"/>
+          </a:fillRef>
+          <a:effectRef idx="0">
+            <a:schemeClr val="accent1"/>
+          </a:effectRef>
+          <a:fontRef idx="minor">
+            <a:schemeClr val="lt1"/>
+          </a:fontRef>
+        </p:style>
+        <p:txBody>
+          <a:bodyPr rtlCol="0" anchor="ctr"/>
+          <a:lstStyle/>
+          <a:p>
+            <a:pPr algn="ctr"/>
+            <a:r>
+              <a:rPr lang="ko-KR" altLang="en-US" sz="1200" dirty="0">
+                <a:latin typeface="나눔고딕" panose="020D0604000000000000" pitchFamily="50" charset="-127"/>
+                <a:ea typeface="나눔고딕" panose="020D0604000000000000" pitchFamily="50" charset="-127"/>
+              </a:rPr>
+              <a:t>연결 테스트</a:t>
+            </a:r>
+          </a:p>
+        </p:txBody>
+      </p:sp>
+      <p:cxnSp>
+        <p:nvCxnSpPr>
+          <p:cNvPr id="46" name="직선 화살표 연결선 45">
+            <a:extLst>
+              <a:ext uri="{FF2B5EF4-FFF2-40B4-BE49-F238E27FC236}">
+                <a16:creationId xmlns:a16="http://schemas.microsoft.com/office/drawing/2014/main" id="{F0B09107-5D76-4DBF-B376-74B0059941CB}"/>
+              </a:ext>
+            </a:extLst>
+          </p:cNvPr>
+          <p:cNvCxnSpPr>
+            <a:cxnSpLocks/>
+            <a:stCxn id="41" idx="2"/>
+            <a:endCxn id="42" idx="0"/>
+          </p:cNvCxnSpPr>
+          <p:nvPr/>
+        </p:nvCxnSpPr>
+        <p:spPr>
+          <a:xfrm flipH="1">
+            <a:off x="1088968" y="2166850"/>
+            <a:ext cx="1138843" cy="399011"/>
+          </a:xfrm>
+          <a:prstGeom prst="straightConnector1">
+            <a:avLst/>
+          </a:prstGeom>
+          <a:ln>
+            <a:tailEnd type="triangle"/>
+          </a:ln>
+        </p:spPr>
+        <p:style>
+          <a:lnRef idx="1">
+            <a:schemeClr val="accent1"/>
+          </a:lnRef>
+          <a:fillRef idx="0">
+            <a:schemeClr val="accent1"/>
+          </a:fillRef>
+          <a:effectRef idx="0">
+            <a:schemeClr val="accent1"/>
+          </a:effectRef>
+          <a:fontRef idx="minor">
+            <a:schemeClr val="tx1"/>
+          </a:fontRef>
+        </p:style>
+      </p:cxnSp>
+      <p:cxnSp>
+        <p:nvCxnSpPr>
+          <p:cNvPr id="49" name="직선 화살표 연결선 48">
+            <a:extLst>
+              <a:ext uri="{FF2B5EF4-FFF2-40B4-BE49-F238E27FC236}">
+                <a16:creationId xmlns:a16="http://schemas.microsoft.com/office/drawing/2014/main" id="{7699D496-9506-41B9-9DF9-C80BD674AFA6}"/>
+              </a:ext>
+            </a:extLst>
+          </p:cNvPr>
+          <p:cNvCxnSpPr>
+            <a:cxnSpLocks/>
+            <a:stCxn id="41" idx="2"/>
+            <a:endCxn id="45" idx="0"/>
+          </p:cNvCxnSpPr>
+          <p:nvPr/>
+        </p:nvCxnSpPr>
+        <p:spPr>
+          <a:xfrm>
+            <a:off x="2227811" y="2166850"/>
+            <a:ext cx="1138845" cy="399011"/>
+          </a:xfrm>
+          <a:prstGeom prst="straightConnector1">
+            <a:avLst/>
+          </a:prstGeom>
+          <a:ln>
+            <a:tailEnd type="triangle"/>
+          </a:ln>
+        </p:spPr>
+        <p:style>
+          <a:lnRef idx="1">
+            <a:schemeClr val="accent1"/>
+          </a:lnRef>
+          <a:fillRef idx="0">
+            <a:schemeClr val="accent1"/>
+          </a:fillRef>
+          <a:effectRef idx="0">
+            <a:schemeClr val="accent1"/>
+          </a:effectRef>
+          <a:fontRef idx="minor">
+            <a:schemeClr val="tx1"/>
+          </a:fontRef>
+        </p:style>
+      </p:cxnSp>
+      <p:sp>
+        <p:nvSpPr>
+          <p:cNvPr id="55" name="직사각형 54">
+            <a:extLst>
+              <a:ext uri="{FF2B5EF4-FFF2-40B4-BE49-F238E27FC236}">
+                <a16:creationId xmlns:a16="http://schemas.microsoft.com/office/drawing/2014/main" id="{64FD88DA-FEB8-4EDE-8A55-895D3B18F993}"/>
+              </a:ext>
+            </a:extLst>
+          </p:cNvPr>
+          <p:cNvSpPr/>
+          <p:nvPr/>
+        </p:nvSpPr>
+        <p:spPr>
+          <a:xfrm>
+            <a:off x="606828" y="3635434"/>
+            <a:ext cx="964277" cy="656706"/>
+          </a:xfrm>
+          <a:prstGeom prst="rect">
+            <a:avLst/>
+          </a:prstGeom>
+        </p:spPr>
+        <p:style>
+          <a:lnRef idx="2">
+            <a:schemeClr val="accent1">
+              <a:shade val="50000"/>
+            </a:schemeClr>
+          </a:lnRef>
+          <a:fillRef idx="1">
+            <a:schemeClr val="accent1"/>
+          </a:fillRef>
+          <a:effectRef idx="0">
+            <a:schemeClr val="accent1"/>
+          </a:effectRef>
+          <a:fontRef idx="minor">
+            <a:schemeClr val="lt1"/>
+          </a:fontRef>
+        </p:style>
+        <p:txBody>
+          <a:bodyPr rtlCol="0" anchor="ctr"/>
+          <a:lstStyle/>
+          <a:p>
+            <a:pPr algn="ctr"/>
+            <a:r>
+              <a:rPr lang="ko-KR" altLang="en-US" sz="1200" dirty="0">
+                <a:latin typeface="나눔고딕" panose="020D0604000000000000" pitchFamily="50" charset="-127"/>
+                <a:ea typeface="나눔고딕" panose="020D0604000000000000" pitchFamily="50" charset="-127"/>
+              </a:rPr>
+              <a:t>탐색 창 </a:t>
+            </a:r>
+            <a:r>
+              <a:rPr lang="en-US" altLang="ko-KR" sz="1200" dirty="0">
+                <a:latin typeface="나눔고딕" panose="020D0604000000000000" pitchFamily="50" charset="-127"/>
+                <a:ea typeface="나눔고딕" panose="020D0604000000000000" pitchFamily="50" charset="-127"/>
+              </a:rPr>
+              <a:t>List </a:t>
+            </a:r>
+            <a:r>
+              <a:rPr lang="ko-KR" altLang="en-US" sz="1200" dirty="0">
+                <a:latin typeface="나눔고딕" panose="020D0604000000000000" pitchFamily="50" charset="-127"/>
+                <a:ea typeface="나눔고딕" panose="020D0604000000000000" pitchFamily="50" charset="-127"/>
+              </a:rPr>
+              <a:t>추가</a:t>
+            </a:r>
+          </a:p>
+        </p:txBody>
+      </p:sp>
+      <p:cxnSp>
+        <p:nvCxnSpPr>
+          <p:cNvPr id="56" name="직선 화살표 연결선 55">
+            <a:extLst>
+              <a:ext uri="{FF2B5EF4-FFF2-40B4-BE49-F238E27FC236}">
+                <a16:creationId xmlns:a16="http://schemas.microsoft.com/office/drawing/2014/main" id="{2EBF0475-06C0-4D63-B1BB-CDD6708D480E}"/>
+              </a:ext>
+            </a:extLst>
+          </p:cNvPr>
+          <p:cNvCxnSpPr>
+            <a:cxnSpLocks/>
+            <a:stCxn id="42" idx="2"/>
+            <a:endCxn id="55" idx="0"/>
+          </p:cNvCxnSpPr>
+          <p:nvPr/>
+        </p:nvCxnSpPr>
+        <p:spPr>
+          <a:xfrm flipH="1">
+            <a:off x="1088967" y="3222567"/>
+            <a:ext cx="1" cy="412867"/>
+          </a:xfrm>
+          <a:prstGeom prst="straightConnector1">
+            <a:avLst/>
+          </a:prstGeom>
+          <a:ln>
+            <a:tailEnd type="triangle"/>
+          </a:ln>
+        </p:spPr>
+        <p:style>
+          <a:lnRef idx="1">
+            <a:schemeClr val="accent1"/>
+          </a:lnRef>
+          <a:fillRef idx="0">
+            <a:schemeClr val="accent1"/>
+          </a:fillRef>
+          <a:effectRef idx="0">
+            <a:schemeClr val="accent1"/>
+          </a:effectRef>
+          <a:fontRef idx="minor">
+            <a:schemeClr val="tx1"/>
+          </a:fontRef>
+        </p:style>
+      </p:cxnSp>
+      <p:sp>
+        <p:nvSpPr>
+          <p:cNvPr id="62" name="직사각형 61">
+            <a:extLst>
+              <a:ext uri="{FF2B5EF4-FFF2-40B4-BE49-F238E27FC236}">
+                <a16:creationId xmlns:a16="http://schemas.microsoft.com/office/drawing/2014/main" id="{524A9FB9-DC2D-4049-AEE7-D7C130FC38C3}"/>
+              </a:ext>
+            </a:extLst>
+          </p:cNvPr>
+          <p:cNvSpPr/>
+          <p:nvPr/>
+        </p:nvSpPr>
+        <p:spPr>
+          <a:xfrm>
+            <a:off x="1745673" y="2561707"/>
+            <a:ext cx="964276" cy="656706"/>
+          </a:xfrm>
+          <a:prstGeom prst="rect">
+            <a:avLst/>
+          </a:prstGeom>
+        </p:spPr>
+        <p:style>
+          <a:lnRef idx="2">
+            <a:schemeClr val="accent1">
+              <a:shade val="50000"/>
+            </a:schemeClr>
+          </a:lnRef>
+          <a:fillRef idx="1">
+            <a:schemeClr val="accent1"/>
+          </a:fillRef>
+          <a:effectRef idx="0">
+            <a:schemeClr val="accent1"/>
+          </a:effectRef>
+          <a:fontRef idx="minor">
+            <a:schemeClr val="lt1"/>
+          </a:fontRef>
+        </p:style>
+        <p:txBody>
+          <a:bodyPr rtlCol="0" anchor="ctr"/>
+          <a:lstStyle/>
+          <a:p>
+            <a:pPr algn="ctr"/>
+            <a:r>
+              <a:rPr lang="ko-KR" altLang="en-US" sz="1200" dirty="0">
+                <a:latin typeface="나눔고딕" panose="020D0604000000000000" pitchFamily="50" charset="-127"/>
+                <a:ea typeface="나눔고딕" panose="020D0604000000000000" pitchFamily="50" charset="-127"/>
+              </a:rPr>
+              <a:t>연결 실패</a:t>
+            </a:r>
+          </a:p>
+        </p:txBody>
+      </p:sp>
+      <p:cxnSp>
+        <p:nvCxnSpPr>
+          <p:cNvPr id="66" name="직선 화살표 연결선 65">
+            <a:extLst>
+              <a:ext uri="{FF2B5EF4-FFF2-40B4-BE49-F238E27FC236}">
+                <a16:creationId xmlns:a16="http://schemas.microsoft.com/office/drawing/2014/main" id="{3491CFEF-E6C6-4443-9F4F-033C278CF373}"/>
+              </a:ext>
+            </a:extLst>
+          </p:cNvPr>
+          <p:cNvCxnSpPr>
+            <a:cxnSpLocks/>
+            <a:stCxn id="41" idx="2"/>
+            <a:endCxn id="62" idx="0"/>
+          </p:cNvCxnSpPr>
+          <p:nvPr/>
+        </p:nvCxnSpPr>
+        <p:spPr>
+          <a:xfrm>
+            <a:off x="2227811" y="2166850"/>
+            <a:ext cx="0" cy="394857"/>
+          </a:xfrm>
+          <a:prstGeom prst="straightConnector1">
+            <a:avLst/>
+          </a:prstGeom>
+          <a:ln>
+            <a:tailEnd type="triangle"/>
+          </a:ln>
+        </p:spPr>
+        <p:style>
+          <a:lnRef idx="1">
+            <a:schemeClr val="accent1"/>
+          </a:lnRef>
+          <a:fillRef idx="0">
+            <a:schemeClr val="accent1"/>
+          </a:fillRef>
+          <a:effectRef idx="0">
+            <a:schemeClr val="accent1"/>
+          </a:effectRef>
+          <a:fontRef idx="minor">
+            <a:schemeClr val="tx1"/>
+          </a:fontRef>
+        </p:style>
+      </p:cxnSp>
+      <p:sp>
+        <p:nvSpPr>
+          <p:cNvPr id="67" name="직사각형 66">
+            <a:extLst>
+              <a:ext uri="{FF2B5EF4-FFF2-40B4-BE49-F238E27FC236}">
+                <a16:creationId xmlns:a16="http://schemas.microsoft.com/office/drawing/2014/main" id="{087A7521-1C1E-4D09-A9DF-D9EF871B5A4C}"/>
+              </a:ext>
+            </a:extLst>
+          </p:cNvPr>
+          <p:cNvSpPr/>
+          <p:nvPr/>
+        </p:nvSpPr>
+        <p:spPr>
+          <a:xfrm>
+            <a:off x="1745673" y="3635434"/>
+            <a:ext cx="964276" cy="656706"/>
+          </a:xfrm>
+          <a:prstGeom prst="rect">
+            <a:avLst/>
+          </a:prstGeom>
+        </p:spPr>
+        <p:style>
+          <a:lnRef idx="2">
+            <a:schemeClr val="accent1">
+              <a:shade val="50000"/>
+            </a:schemeClr>
+          </a:lnRef>
+          <a:fillRef idx="1">
+            <a:schemeClr val="accent1"/>
+          </a:fillRef>
+          <a:effectRef idx="0">
+            <a:schemeClr val="accent1"/>
+          </a:effectRef>
+          <a:fontRef idx="minor">
+            <a:schemeClr val="lt1"/>
+          </a:fontRef>
+        </p:style>
+        <p:txBody>
+          <a:bodyPr rtlCol="0" anchor="ctr"/>
+          <a:lstStyle/>
+          <a:p>
+            <a:pPr algn="ctr"/>
+            <a:r>
+              <a:rPr lang="ko-KR" altLang="en-US" sz="1200" dirty="0">
+                <a:latin typeface="나눔고딕" panose="020D0604000000000000" pitchFamily="50" charset="-127"/>
+                <a:ea typeface="나눔고딕" panose="020D0604000000000000" pitchFamily="50" charset="-127"/>
+              </a:rPr>
+              <a:t>연결 실패</a:t>
+            </a:r>
+            <a:endParaRPr lang="en-US" altLang="ko-KR" sz="1200" dirty="0">
+              <a:latin typeface="나눔고딕" panose="020D0604000000000000" pitchFamily="50" charset="-127"/>
+              <a:ea typeface="나눔고딕" panose="020D0604000000000000" pitchFamily="50" charset="-127"/>
+            </a:endParaRPr>
+          </a:p>
+          <a:p>
+            <a:pPr algn="ctr"/>
+            <a:r>
+              <a:rPr lang="en-US" altLang="ko-KR" sz="1200" dirty="0">
+                <a:latin typeface="나눔고딕" panose="020D0604000000000000" pitchFamily="50" charset="-127"/>
+                <a:ea typeface="나눔고딕" panose="020D0604000000000000" pitchFamily="50" charset="-127"/>
+              </a:rPr>
+              <a:t>Popup</a:t>
+            </a:r>
+            <a:endParaRPr lang="ko-KR" altLang="en-US" sz="1200" dirty="0">
+              <a:latin typeface="나눔고딕" panose="020D0604000000000000" pitchFamily="50" charset="-127"/>
+              <a:ea typeface="나눔고딕" panose="020D0604000000000000" pitchFamily="50" charset="-127"/>
+            </a:endParaRPr>
+          </a:p>
+        </p:txBody>
+      </p:sp>
+      <p:cxnSp>
+        <p:nvCxnSpPr>
+          <p:cNvPr id="68" name="직선 화살표 연결선 67">
+            <a:extLst>
+              <a:ext uri="{FF2B5EF4-FFF2-40B4-BE49-F238E27FC236}">
+                <a16:creationId xmlns:a16="http://schemas.microsoft.com/office/drawing/2014/main" id="{3197485C-FDEE-4B33-B034-8ABB0C7A4FE6}"/>
+              </a:ext>
+            </a:extLst>
+          </p:cNvPr>
+          <p:cNvCxnSpPr>
+            <a:cxnSpLocks/>
+            <a:stCxn id="62" idx="2"/>
+            <a:endCxn id="67" idx="0"/>
+          </p:cNvCxnSpPr>
+          <p:nvPr/>
+        </p:nvCxnSpPr>
+        <p:spPr>
+          <a:xfrm>
+            <a:off x="2227811" y="3218413"/>
+            <a:ext cx="0" cy="417021"/>
+          </a:xfrm>
+          <a:prstGeom prst="straightConnector1">
+            <a:avLst/>
+          </a:prstGeom>
+          <a:ln>
+            <a:tailEnd type="triangle"/>
+          </a:ln>
+        </p:spPr>
+        <p:style>
+          <a:lnRef idx="1">
+            <a:schemeClr val="accent1"/>
+          </a:lnRef>
+          <a:fillRef idx="0">
+            <a:schemeClr val="accent1"/>
+          </a:fillRef>
+          <a:effectRef idx="0">
+            <a:schemeClr val="accent1"/>
+          </a:effectRef>
+          <a:fontRef idx="minor">
+            <a:schemeClr val="tx1"/>
+          </a:fontRef>
+        </p:style>
+      </p:cxnSp>
+      <p:cxnSp>
+        <p:nvCxnSpPr>
+          <p:cNvPr id="71" name="직선 화살표 연결선 70">
+            <a:extLst>
+              <a:ext uri="{FF2B5EF4-FFF2-40B4-BE49-F238E27FC236}">
+                <a16:creationId xmlns:a16="http://schemas.microsoft.com/office/drawing/2014/main" id="{EEEE41AE-1E6F-45AB-B574-C4847764127D}"/>
+              </a:ext>
+            </a:extLst>
+          </p:cNvPr>
+          <p:cNvCxnSpPr>
+            <a:cxnSpLocks/>
+            <a:stCxn id="45" idx="2"/>
+            <a:endCxn id="72" idx="0"/>
+          </p:cNvCxnSpPr>
+          <p:nvPr/>
+        </p:nvCxnSpPr>
+        <p:spPr>
+          <a:xfrm flipH="1">
+            <a:off x="3366654" y="3222567"/>
+            <a:ext cx="2" cy="399010"/>
+          </a:xfrm>
+          <a:prstGeom prst="straightConnector1">
+            <a:avLst/>
+          </a:prstGeom>
+          <a:ln>
+            <a:tailEnd type="triangle"/>
+          </a:ln>
+        </p:spPr>
+        <p:style>
+          <a:lnRef idx="1">
+            <a:schemeClr val="accent1"/>
+          </a:lnRef>
+          <a:fillRef idx="0">
+            <a:schemeClr val="accent1"/>
+          </a:fillRef>
+          <a:effectRef idx="0">
+            <a:schemeClr val="accent1"/>
+          </a:effectRef>
+          <a:fontRef idx="minor">
+            <a:schemeClr val="tx1"/>
+          </a:fontRef>
+        </p:style>
+      </p:cxnSp>
+      <p:sp>
+        <p:nvSpPr>
+          <p:cNvPr id="72" name="직사각형 71">
+            <a:extLst>
+              <a:ext uri="{FF2B5EF4-FFF2-40B4-BE49-F238E27FC236}">
+                <a16:creationId xmlns:a16="http://schemas.microsoft.com/office/drawing/2014/main" id="{02995BC4-58BD-4512-8D7B-49706D48712E}"/>
+              </a:ext>
+            </a:extLst>
+          </p:cNvPr>
+          <p:cNvSpPr/>
+          <p:nvPr/>
+        </p:nvSpPr>
+        <p:spPr>
+          <a:xfrm>
+            <a:off x="2884516" y="3621577"/>
+            <a:ext cx="964276" cy="656706"/>
+          </a:xfrm>
+          <a:prstGeom prst="rect">
+            <a:avLst/>
+          </a:prstGeom>
+        </p:spPr>
+        <p:style>
+          <a:lnRef idx="2">
+            <a:schemeClr val="accent1">
+              <a:shade val="50000"/>
+            </a:schemeClr>
+          </a:lnRef>
+          <a:fillRef idx="1">
+            <a:schemeClr val="accent1"/>
+          </a:fillRef>
+          <a:effectRef idx="0">
+            <a:schemeClr val="accent1"/>
+          </a:effectRef>
+          <a:fontRef idx="minor">
+            <a:schemeClr val="lt1"/>
+          </a:fontRef>
+        </p:style>
+        <p:txBody>
+          <a:bodyPr rtlCol="0" anchor="ctr"/>
+          <a:lstStyle/>
+          <a:p>
+            <a:pPr algn="ctr"/>
+            <a:r>
+              <a:rPr lang="ko-KR" altLang="en-US" sz="1200" dirty="0">
+                <a:latin typeface="나눔고딕" panose="020D0604000000000000" pitchFamily="50" charset="-127"/>
+                <a:ea typeface="나눔고딕" panose="020D0604000000000000" pitchFamily="50" charset="-127"/>
+              </a:rPr>
+              <a:t>테스트 결과</a:t>
+            </a:r>
+            <a:endParaRPr lang="en-US" altLang="ko-KR" sz="1200" dirty="0">
+              <a:latin typeface="나눔고딕" panose="020D0604000000000000" pitchFamily="50" charset="-127"/>
+              <a:ea typeface="나눔고딕" panose="020D0604000000000000" pitchFamily="50" charset="-127"/>
+            </a:endParaRPr>
+          </a:p>
+          <a:p>
+            <a:pPr algn="ctr"/>
+            <a:r>
+              <a:rPr lang="en-US" altLang="ko-KR" sz="1200" dirty="0">
+                <a:latin typeface="나눔고딕" panose="020D0604000000000000" pitchFamily="50" charset="-127"/>
+                <a:ea typeface="나눔고딕" panose="020D0604000000000000" pitchFamily="50" charset="-127"/>
+              </a:rPr>
+              <a:t>Popup</a:t>
+            </a:r>
+          </a:p>
+        </p:txBody>
+      </p:sp>
+    </p:spTree>
+    <p:extLst>
+      <p:ext uri="{BB962C8B-B14F-4D97-AF65-F5344CB8AC3E}">
+        <p14:creationId xmlns:p14="http://schemas.microsoft.com/office/powerpoint/2010/main" val="3684834579"/>
+      </p:ext>
+    </p:extLst>
+  </p:cSld>
+  <p:clrMapOvr>
+    <a:masterClrMapping/>
+  </p:clrMapOvr>
+</p:sld>
+</file>
+
+<file path=ppt/slides/slide3.xml><?xml version="1.0" encoding="utf-8"?>
+<p:sld xmlns:a="http://schemas.openxmlformats.org/drawingml/2006/main" xmlns:r="http://schemas.openxmlformats.org/officeDocument/2006/relationships" xmlns:p="http://schemas.openxmlformats.org/presentationml/2006/main">
+  <p:cSld>
+    <p:spTree>
+      <p:nvGrpSpPr>
+        <p:cNvPr id="1" name=""/>
+        <p:cNvGrpSpPr/>
+        <p:nvPr/>
+      </p:nvGrpSpPr>
+      <p:grpSpPr>
+        <a:xfrm>
+          <a:off x="0" y="0"/>
+          <a:ext cx="0" cy="0"/>
+          <a:chOff x="0" y="0"/>
+          <a:chExt cx="0" cy="0"/>
+        </a:xfrm>
+      </p:grpSpPr>
+      <p:pic>
+        <p:nvPicPr>
+          <p:cNvPr id="30" name="그림 29">
+            <a:extLst>
+              <a:ext uri="{FF2B5EF4-FFF2-40B4-BE49-F238E27FC236}">
+                <a16:creationId xmlns:a16="http://schemas.microsoft.com/office/drawing/2014/main" id="{31FA68A9-4863-4417-A94F-1BF0D6C64302}"/>
+              </a:ext>
+            </a:extLst>
+          </p:cNvPr>
+          <p:cNvPicPr>
+            <a:picLocks noChangeAspect="1"/>
+          </p:cNvPicPr>
+          <p:nvPr/>
+        </p:nvPicPr>
+        <p:blipFill>
+          <a:blip r:embed="rId2"/>
+          <a:stretch>
+            <a:fillRect/>
+          </a:stretch>
+        </p:blipFill>
+        <p:spPr>
+          <a:xfrm>
+            <a:off x="889779" y="1132724"/>
+            <a:ext cx="2864485" cy="2458374"/>
+          </a:xfrm>
+          <a:prstGeom prst="rect">
+            <a:avLst/>
+          </a:prstGeom>
+        </p:spPr>
+      </p:pic>
+    </p:spTree>
+    <p:extLst>
+      <p:ext uri="{BB962C8B-B14F-4D97-AF65-F5344CB8AC3E}">
+        <p14:creationId xmlns:p14="http://schemas.microsoft.com/office/powerpoint/2010/main" val="854754756"/>
+      </p:ext>
+    </p:extLst>
+  </p:cSld>
+  <p:clrMapOvr>
+    <a:masterClrMapping/>
+  </p:clrMapOvr>
+</p:sld>
+</file>
+
+<file path=ppt/slides/slide4.xml><?xml version="1.0" encoding="utf-8"?>
+<p:sld xmlns:a="http://schemas.openxmlformats.org/drawingml/2006/main" xmlns:r="http://schemas.openxmlformats.org/officeDocument/2006/relationships" xmlns:p="http://schemas.openxmlformats.org/presentationml/2006/main">
+  <p:cSld>
+    <p:spTree>
+      <p:nvGrpSpPr>
+        <p:cNvPr id="1" name=""/>
+        <p:cNvGrpSpPr/>
+        <p:nvPr/>
+      </p:nvGrpSpPr>
+      <p:grpSpPr>
+        <a:xfrm>
+          <a:off x="0" y="0"/>
+          <a:ext cx="0" cy="0"/>
+          <a:chOff x="0" y="0"/>
+          <a:chExt cx="0" cy="0"/>
+        </a:xfrm>
+      </p:grpSpPr>
+      <p:sp>
+        <p:nvSpPr>
+          <p:cNvPr id="9" name="직사각형 8">
+            <a:extLst>
+              <a:ext uri="{FF2B5EF4-FFF2-40B4-BE49-F238E27FC236}">
+                <a16:creationId xmlns:a16="http://schemas.microsoft.com/office/drawing/2014/main" id="{33204D42-769B-4345-A235-69F2378115CA}"/>
+              </a:ext>
+            </a:extLst>
+          </p:cNvPr>
+          <p:cNvSpPr/>
+          <p:nvPr/>
+        </p:nvSpPr>
+        <p:spPr>
+          <a:xfrm>
+            <a:off x="606829" y="473825"/>
+            <a:ext cx="3241964" cy="656706"/>
+          </a:xfrm>
+          <a:prstGeom prst="rect">
+            <a:avLst/>
+          </a:prstGeom>
+        </p:spPr>
+        <p:style>
+          <a:lnRef idx="2">
+            <a:schemeClr val="accent1">
+              <a:shade val="50000"/>
+            </a:schemeClr>
+          </a:lnRef>
+          <a:fillRef idx="1">
+            <a:schemeClr val="accent1"/>
+          </a:fillRef>
+          <a:effectRef idx="0">
+            <a:schemeClr val="accent1"/>
+          </a:effectRef>
+          <a:fontRef idx="minor">
+            <a:schemeClr val="lt1"/>
+          </a:fontRef>
+        </p:style>
+        <p:txBody>
+          <a:bodyPr rtlCol="0" anchor="ctr"/>
+          <a:lstStyle/>
+          <a:p>
+            <a:pPr algn="ctr"/>
+            <a:r>
+              <a:rPr lang="ko-KR" altLang="en-US" sz="1200" dirty="0">
+                <a:latin typeface="나눔고딕" panose="020D0604000000000000" pitchFamily="50" charset="-127"/>
+                <a:ea typeface="나눔고딕" panose="020D0604000000000000" pitchFamily="50" charset="-127"/>
+              </a:rPr>
+              <a:t>질의창에서 질의 실행</a:t>
+            </a:r>
+          </a:p>
+        </p:txBody>
+      </p:sp>
+      <p:sp>
+        <p:nvSpPr>
+          <p:cNvPr id="41" name="직사각형 40">
+            <a:extLst>
+              <a:ext uri="{FF2B5EF4-FFF2-40B4-BE49-F238E27FC236}">
+                <a16:creationId xmlns:a16="http://schemas.microsoft.com/office/drawing/2014/main" id="{59C4B2C8-F040-4398-A545-5C8C0A411CD1}"/>
+              </a:ext>
+            </a:extLst>
+          </p:cNvPr>
+          <p:cNvSpPr/>
+          <p:nvPr/>
+        </p:nvSpPr>
+        <p:spPr>
+          <a:xfrm>
+            <a:off x="606829" y="1510144"/>
+            <a:ext cx="3241964" cy="656706"/>
+          </a:xfrm>
+          <a:prstGeom prst="rect">
+            <a:avLst/>
+          </a:prstGeom>
+        </p:spPr>
+        <p:style>
+          <a:lnRef idx="2">
+            <a:schemeClr val="accent1">
+              <a:shade val="50000"/>
+            </a:schemeClr>
+          </a:lnRef>
+          <a:fillRef idx="1">
+            <a:schemeClr val="accent1"/>
+          </a:fillRef>
+          <a:effectRef idx="0">
+            <a:schemeClr val="accent1"/>
+          </a:effectRef>
+          <a:fontRef idx="minor">
+            <a:schemeClr val="lt1"/>
+          </a:fontRef>
+        </p:style>
+        <p:txBody>
+          <a:bodyPr rtlCol="0" anchor="ctr"/>
+          <a:lstStyle/>
+          <a:p>
+            <a:pPr algn="ctr"/>
+            <a:r>
+              <a:rPr lang="en-US" altLang="ko-KR" sz="1200" dirty="0">
+                <a:latin typeface="나눔고딕" panose="020D0604000000000000" pitchFamily="50" charset="-127"/>
+                <a:ea typeface="나눔고딕" panose="020D0604000000000000" pitchFamily="50" charset="-127"/>
+              </a:rPr>
+              <a:t>Driver for IITP GDBMS</a:t>
+            </a:r>
+            <a:endParaRPr lang="ko-KR" altLang="en-US" sz="1200" dirty="0">
+              <a:latin typeface="나눔고딕" panose="020D0604000000000000" pitchFamily="50" charset="-127"/>
+              <a:ea typeface="나눔고딕" panose="020D0604000000000000" pitchFamily="50" charset="-127"/>
+            </a:endParaRPr>
+          </a:p>
+        </p:txBody>
+      </p:sp>
+      <p:cxnSp>
+        <p:nvCxnSpPr>
+          <p:cNvPr id="11" name="직선 화살표 연결선 10">
+            <a:extLst>
+              <a:ext uri="{FF2B5EF4-FFF2-40B4-BE49-F238E27FC236}">
+                <a16:creationId xmlns:a16="http://schemas.microsoft.com/office/drawing/2014/main" id="{6D0E273C-CCAF-43D7-8743-E57EE3ACA297}"/>
+              </a:ext>
+            </a:extLst>
+          </p:cNvPr>
+          <p:cNvCxnSpPr>
+            <a:stCxn id="9" idx="2"/>
+            <a:endCxn id="41" idx="0"/>
+          </p:cNvCxnSpPr>
+          <p:nvPr/>
+        </p:nvCxnSpPr>
+        <p:spPr>
+          <a:xfrm>
+            <a:off x="2227811" y="1130531"/>
+            <a:ext cx="0" cy="379613"/>
+          </a:xfrm>
+          <a:prstGeom prst="straightConnector1">
+            <a:avLst/>
+          </a:prstGeom>
+          <a:ln>
+            <a:tailEnd type="triangle"/>
+          </a:ln>
+        </p:spPr>
+        <p:style>
+          <a:lnRef idx="1">
+            <a:schemeClr val="accent1"/>
+          </a:lnRef>
+          <a:fillRef idx="0">
+            <a:schemeClr val="accent1"/>
+          </a:fillRef>
+          <a:effectRef idx="0">
+            <a:schemeClr val="accent1"/>
+          </a:effectRef>
+          <a:fontRef idx="minor">
+            <a:schemeClr val="tx1"/>
+          </a:fontRef>
+        </p:style>
+      </p:cxnSp>
+      <p:cxnSp>
+        <p:nvCxnSpPr>
+          <p:cNvPr id="17" name="직선 화살표 연결선 16">
+            <a:extLst>
+              <a:ext uri="{FF2B5EF4-FFF2-40B4-BE49-F238E27FC236}">
+                <a16:creationId xmlns:a16="http://schemas.microsoft.com/office/drawing/2014/main" id="{9EAA6C8B-D9DA-461D-A146-E42ECB94ADD4}"/>
+              </a:ext>
+            </a:extLst>
+          </p:cNvPr>
+          <p:cNvCxnSpPr>
+            <a:cxnSpLocks/>
+            <a:stCxn id="41" idx="2"/>
+            <a:endCxn id="22" idx="0"/>
+          </p:cNvCxnSpPr>
+          <p:nvPr/>
+        </p:nvCxnSpPr>
+        <p:spPr>
+          <a:xfrm>
+            <a:off x="2227811" y="2166850"/>
+            <a:ext cx="0" cy="491834"/>
+          </a:xfrm>
+          <a:prstGeom prst="straightConnector1">
+            <a:avLst/>
+          </a:prstGeom>
+          <a:ln>
+            <a:tailEnd type="triangle"/>
+          </a:ln>
+        </p:spPr>
+        <p:style>
+          <a:lnRef idx="1">
+            <a:schemeClr val="accent1"/>
+          </a:lnRef>
+          <a:fillRef idx="0">
+            <a:schemeClr val="accent1"/>
+          </a:fillRef>
+          <a:effectRef idx="0">
+            <a:schemeClr val="accent1"/>
+          </a:effectRef>
+          <a:fontRef idx="minor">
+            <a:schemeClr val="tx1"/>
+          </a:fontRef>
+        </p:style>
+      </p:cxnSp>
+      <p:sp>
+        <p:nvSpPr>
+          <p:cNvPr id="22" name="직사각형 21">
+            <a:extLst>
+              <a:ext uri="{FF2B5EF4-FFF2-40B4-BE49-F238E27FC236}">
+                <a16:creationId xmlns:a16="http://schemas.microsoft.com/office/drawing/2014/main" id="{A0E8ABD9-4903-4476-9E4A-9C6C738180B8}"/>
+              </a:ext>
+            </a:extLst>
+          </p:cNvPr>
+          <p:cNvSpPr/>
+          <p:nvPr/>
+        </p:nvSpPr>
+        <p:spPr>
+          <a:xfrm>
+            <a:off x="606829" y="2658684"/>
+            <a:ext cx="3241964" cy="656706"/>
+          </a:xfrm>
+          <a:prstGeom prst="rect">
+            <a:avLst/>
+          </a:prstGeom>
+        </p:spPr>
+        <p:style>
+          <a:lnRef idx="2">
+            <a:schemeClr val="accent1">
+              <a:shade val="50000"/>
+            </a:schemeClr>
+          </a:lnRef>
+          <a:fillRef idx="1">
+            <a:schemeClr val="accent1"/>
+          </a:fillRef>
+          <a:effectRef idx="0">
+            <a:schemeClr val="accent1"/>
+          </a:effectRef>
+          <a:fontRef idx="minor">
+            <a:schemeClr val="lt1"/>
+          </a:fontRef>
+        </p:style>
+        <p:txBody>
+          <a:bodyPr rtlCol="0" anchor="ctr"/>
+          <a:lstStyle/>
+          <a:p>
+            <a:pPr algn="ctr"/>
+            <a:r>
+              <a:rPr lang="en-US" altLang="ko-KR" sz="1200" dirty="0">
+                <a:latin typeface="나눔고딕" panose="020D0604000000000000" pitchFamily="50" charset="-127"/>
+                <a:ea typeface="나눔고딕" panose="020D0604000000000000" pitchFamily="50" charset="-127"/>
+              </a:rPr>
+              <a:t>Gephi Lib ( Graph </a:t>
+            </a:r>
+            <a:r>
+              <a:rPr lang="ko-KR" altLang="en-US" sz="1200" dirty="0">
+                <a:latin typeface="나눔고딕" panose="020D0604000000000000" pitchFamily="50" charset="-127"/>
+                <a:ea typeface="나눔고딕" panose="020D0604000000000000" pitchFamily="50" charset="-127"/>
+              </a:rPr>
+              <a:t>구조관리</a:t>
+            </a:r>
+            <a:r>
+              <a:rPr lang="en-US" altLang="ko-KR" sz="1200" dirty="0">
+                <a:latin typeface="나눔고딕" panose="020D0604000000000000" pitchFamily="50" charset="-127"/>
+                <a:ea typeface="나눔고딕" panose="020D0604000000000000" pitchFamily="50" charset="-127"/>
+              </a:rPr>
+              <a:t>)</a:t>
+            </a:r>
+          </a:p>
+          <a:p>
+            <a:pPr algn="ctr"/>
+            <a:r>
+              <a:rPr lang="en-US" altLang="ko-KR" sz="1200" dirty="0">
+                <a:latin typeface="나눔고딕" panose="020D0604000000000000" pitchFamily="50" charset="-127"/>
+                <a:ea typeface="나눔고딕" panose="020D0604000000000000" pitchFamily="50" charset="-127"/>
+              </a:rPr>
+              <a:t>+</a:t>
+            </a:r>
+          </a:p>
+          <a:p>
+            <a:pPr algn="ctr"/>
+            <a:r>
+              <a:rPr lang="en-US" altLang="ko-KR" sz="1200" dirty="0">
+                <a:latin typeface="나눔고딕" panose="020D0604000000000000" pitchFamily="50" charset="-127"/>
+                <a:ea typeface="나눔고딕" panose="020D0604000000000000" pitchFamily="50" charset="-127"/>
+              </a:rPr>
+              <a:t> UI  Lib ( Graph </a:t>
+            </a:r>
+            <a:r>
+              <a:rPr lang="ko-KR" altLang="en-US" sz="1200" dirty="0">
+                <a:latin typeface="나눔고딕" panose="020D0604000000000000" pitchFamily="50" charset="-127"/>
+                <a:ea typeface="나눔고딕" panose="020D0604000000000000" pitchFamily="50" charset="-127"/>
+              </a:rPr>
+              <a:t>표시 </a:t>
+            </a:r>
+            <a:r>
+              <a:rPr lang="en-US" altLang="ko-KR" sz="1200" dirty="0">
+                <a:latin typeface="나눔고딕" panose="020D0604000000000000" pitchFamily="50" charset="-127"/>
+                <a:ea typeface="나눔고딕" panose="020D0604000000000000" pitchFamily="50" charset="-127"/>
+              </a:rPr>
+              <a:t>)</a:t>
+            </a:r>
+            <a:endParaRPr lang="ko-KR" altLang="en-US" sz="1200" dirty="0">
+              <a:latin typeface="나눔고딕" panose="020D0604000000000000" pitchFamily="50" charset="-127"/>
+              <a:ea typeface="나눔고딕" panose="020D0604000000000000" pitchFamily="50" charset="-127"/>
+            </a:endParaRPr>
+          </a:p>
+        </p:txBody>
+      </p:sp>
+      <p:sp>
+        <p:nvSpPr>
+          <p:cNvPr id="25" name="직사각형 24">
+            <a:extLst>
+              <a:ext uri="{FF2B5EF4-FFF2-40B4-BE49-F238E27FC236}">
+                <a16:creationId xmlns:a16="http://schemas.microsoft.com/office/drawing/2014/main" id="{D2FA38D0-C28C-4D93-86A2-67D1B65F9A65}"/>
+              </a:ext>
+            </a:extLst>
+          </p:cNvPr>
+          <p:cNvSpPr/>
+          <p:nvPr/>
+        </p:nvSpPr>
+        <p:spPr>
+          <a:xfrm>
+            <a:off x="606829" y="3807224"/>
+            <a:ext cx="3241964" cy="656706"/>
+          </a:xfrm>
+          <a:prstGeom prst="rect">
+            <a:avLst/>
+          </a:prstGeom>
+        </p:spPr>
+        <p:style>
+          <a:lnRef idx="2">
+            <a:schemeClr val="accent1">
+              <a:shade val="50000"/>
+            </a:schemeClr>
+          </a:lnRef>
+          <a:fillRef idx="1">
+            <a:schemeClr val="accent1"/>
+          </a:fillRef>
+          <a:effectRef idx="0">
+            <a:schemeClr val="accent1"/>
+          </a:effectRef>
+          <a:fontRef idx="minor">
+            <a:schemeClr val="lt1"/>
+          </a:fontRef>
+        </p:style>
+        <p:txBody>
+          <a:bodyPr rtlCol="0" anchor="ctr"/>
+          <a:lstStyle/>
+          <a:p>
+            <a:pPr algn="ctr"/>
+            <a:r>
+              <a:rPr lang="ko-KR" altLang="en-US" sz="1200" dirty="0">
+                <a:latin typeface="나눔고딕" panose="020D0604000000000000" pitchFamily="50" charset="-127"/>
+                <a:ea typeface="나눔고딕" panose="020D0604000000000000" pitchFamily="50" charset="-127"/>
+              </a:rPr>
+              <a:t>시각화 뷰 결과 표시</a:t>
+            </a:r>
+          </a:p>
+        </p:txBody>
+      </p:sp>
+      <p:cxnSp>
+        <p:nvCxnSpPr>
+          <p:cNvPr id="26" name="직선 화살표 연결선 25">
+            <a:extLst>
+              <a:ext uri="{FF2B5EF4-FFF2-40B4-BE49-F238E27FC236}">
+                <a16:creationId xmlns:a16="http://schemas.microsoft.com/office/drawing/2014/main" id="{EB3A1E05-7110-4BC9-A11C-DC9A7783F753}"/>
+              </a:ext>
+            </a:extLst>
+          </p:cNvPr>
+          <p:cNvCxnSpPr>
+            <a:cxnSpLocks/>
+            <a:stCxn id="22" idx="2"/>
+            <a:endCxn id="25" idx="0"/>
+          </p:cNvCxnSpPr>
+          <p:nvPr/>
+        </p:nvCxnSpPr>
+        <p:spPr>
+          <a:xfrm>
+            <a:off x="2227811" y="3315390"/>
+            <a:ext cx="0" cy="491834"/>
+          </a:xfrm>
+          <a:prstGeom prst="straightConnector1">
+            <a:avLst/>
+          </a:prstGeom>
+          <a:ln>
+            <a:tailEnd type="triangle"/>
+          </a:ln>
+        </p:spPr>
+        <p:style>
+          <a:lnRef idx="1">
+            <a:schemeClr val="accent1"/>
+          </a:lnRef>
+          <a:fillRef idx="0">
+            <a:schemeClr val="accent1"/>
+          </a:fillRef>
+          <a:effectRef idx="0">
+            <a:schemeClr val="accent1"/>
+          </a:effectRef>
+          <a:fontRef idx="minor">
+            <a:schemeClr val="tx1"/>
+          </a:fontRef>
+        </p:style>
+      </p:cxnSp>
+    </p:spTree>
+    <p:extLst>
+      <p:ext uri="{BB962C8B-B14F-4D97-AF65-F5344CB8AC3E}">
+        <p14:creationId xmlns:p14="http://schemas.microsoft.com/office/powerpoint/2010/main" val="2174174708"/>
+      </p:ext>
+    </p:extLst>
+  </p:cSld>
+  <p:clrMapOvr>
+    <a:masterClrMapping/>
+  </p:clrMapOvr>
+</p:sld>
+</file>
+
+<file path=ppt/slides/slide5.xml><?xml version="1.0" encoding="utf-8"?>
+<p:sld xmlns:a="http://schemas.openxmlformats.org/drawingml/2006/main" xmlns:r="http://schemas.openxmlformats.org/officeDocument/2006/relationships" xmlns:p="http://schemas.openxmlformats.org/presentationml/2006/main">
+  <p:cSld>
+    <p:spTree>
+      <p:nvGrpSpPr>
+        <p:cNvPr id="1" name=""/>
+        <p:cNvGrpSpPr/>
+        <p:nvPr/>
+      </p:nvGrpSpPr>
+      <p:grpSpPr>
+        <a:xfrm>
+          <a:off x="0" y="0"/>
+          <a:ext cx="0" cy="0"/>
+          <a:chOff x="0" y="0"/>
+          <a:chExt cx="0" cy="0"/>
+        </a:xfrm>
+      </p:grpSpPr>
+      <p:pic>
+        <p:nvPicPr>
+          <p:cNvPr id="9" name="그림 8">
+            <a:extLst>
+              <a:ext uri="{FF2B5EF4-FFF2-40B4-BE49-F238E27FC236}">
+                <a16:creationId xmlns:a16="http://schemas.microsoft.com/office/drawing/2014/main" id="{86785B0A-A994-439D-8E3E-342A7689804E}"/>
+              </a:ext>
+            </a:extLst>
+          </p:cNvPr>
+          <p:cNvPicPr>
+            <a:picLocks noChangeAspect="1"/>
+          </p:cNvPicPr>
+          <p:nvPr/>
+        </p:nvPicPr>
+        <p:blipFill>
+          <a:blip r:embed="rId2"/>
+          <a:stretch>
+            <a:fillRect/>
+          </a:stretch>
+        </p:blipFill>
+        <p:spPr>
+          <a:xfrm>
+            <a:off x="1879715" y="1820398"/>
+            <a:ext cx="4076700" cy="2352675"/>
+          </a:xfrm>
+          <a:prstGeom prst="rect">
+            <a:avLst/>
+          </a:prstGeom>
+        </p:spPr>
+      </p:pic>
+      <p:pic>
+        <p:nvPicPr>
+          <p:cNvPr id="11" name="그림 10">
+            <a:extLst>
+              <a:ext uri="{FF2B5EF4-FFF2-40B4-BE49-F238E27FC236}">
+                <a16:creationId xmlns:a16="http://schemas.microsoft.com/office/drawing/2014/main" id="{8A2D4D74-5C18-4109-879A-1A2F250AC275}"/>
+              </a:ext>
+            </a:extLst>
+          </p:cNvPr>
+          <p:cNvPicPr>
+            <a:picLocks noChangeAspect="1"/>
+          </p:cNvPicPr>
+          <p:nvPr/>
+        </p:nvPicPr>
+        <p:blipFill>
+          <a:blip r:embed="rId3"/>
+          <a:stretch>
+            <a:fillRect/>
+          </a:stretch>
+        </p:blipFill>
+        <p:spPr>
+          <a:xfrm>
+            <a:off x="5884112" y="1820398"/>
+            <a:ext cx="4048125" cy="2343150"/>
+          </a:xfrm>
+          <a:prstGeom prst="rect">
+            <a:avLst/>
+          </a:prstGeom>
+        </p:spPr>
+      </p:pic>
+    </p:spTree>
+    <p:extLst>
+      <p:ext uri="{BB962C8B-B14F-4D97-AF65-F5344CB8AC3E}">
+        <p14:creationId xmlns:p14="http://schemas.microsoft.com/office/powerpoint/2010/main" val="2510863754"/>
+      </p:ext>
+    </p:extLst>
+  </p:cSld>
+  <p:clrMapOvr>
+    <a:masterClrMapping/>
+  </p:clrMapOvr>
+</p:sld>
+</file>
+
 <file path=ppt/theme/theme1.xml><?xml version="1.0" encoding="utf-8"?>
 <a:theme xmlns:a="http://schemas.openxmlformats.org/drawingml/2006/main" name="Office 테마">
   <a:themeElements>

</xml_diff>

<commit_message>
update document (structural design v0.3) (#28)
* update document (structural design v0.3)
* added excel file for Table list in structural design
</commit_message>
<xml_diff>
--- a/ViT_docs/문서작성용_그림원본.pptx
+++ b/ViT_docs/문서작성용_그림원본.pptx
@@ -6,6 +6,10 @@
   </p:sldMasterIdLst>
   <p:sldIdLst>
     <p:sldId id="256" r:id="rId2"/>
+    <p:sldId id="257" r:id="rId3"/>
+    <p:sldId id="258" r:id="rId4"/>
+    <p:sldId id="259" r:id="rId5"/>
+    <p:sldId id="260" r:id="rId6"/>
   </p:sldIdLst>
   <p:sldSz cx="12192000" cy="6858000"/>
   <p:notesSz cx="6858000" cy="9144000"/>
@@ -259,7 +263,7 @@
           <a:p>
             <a:fld id="{C45A1C21-134E-40EB-8D47-CF3E42B81BA3}" type="datetimeFigureOut">
               <a:rPr lang="ko-KR" altLang="en-US" smtClean="0"/>
-              <a:t>2021-10-27</a:t>
+              <a:t>2021-12-09</a:t>
             </a:fld>
             <a:endParaRPr lang="ko-KR" altLang="en-US"/>
           </a:p>
@@ -457,7 +461,7 @@
           <a:p>
             <a:fld id="{C45A1C21-134E-40EB-8D47-CF3E42B81BA3}" type="datetimeFigureOut">
               <a:rPr lang="ko-KR" altLang="en-US" smtClean="0"/>
-              <a:t>2021-10-27</a:t>
+              <a:t>2021-12-09</a:t>
             </a:fld>
             <a:endParaRPr lang="ko-KR" altLang="en-US"/>
           </a:p>
@@ -665,7 +669,7 @@
           <a:p>
             <a:fld id="{C45A1C21-134E-40EB-8D47-CF3E42B81BA3}" type="datetimeFigureOut">
               <a:rPr lang="ko-KR" altLang="en-US" smtClean="0"/>
-              <a:t>2021-10-27</a:t>
+              <a:t>2021-12-09</a:t>
             </a:fld>
             <a:endParaRPr lang="ko-KR" altLang="en-US"/>
           </a:p>
@@ -863,7 +867,7 @@
           <a:p>
             <a:fld id="{C45A1C21-134E-40EB-8D47-CF3E42B81BA3}" type="datetimeFigureOut">
               <a:rPr lang="ko-KR" altLang="en-US" smtClean="0"/>
-              <a:t>2021-10-27</a:t>
+              <a:t>2021-12-09</a:t>
             </a:fld>
             <a:endParaRPr lang="ko-KR" altLang="en-US"/>
           </a:p>
@@ -1138,7 +1142,7 @@
           <a:p>
             <a:fld id="{C45A1C21-134E-40EB-8D47-CF3E42B81BA3}" type="datetimeFigureOut">
               <a:rPr lang="ko-KR" altLang="en-US" smtClean="0"/>
-              <a:t>2021-10-27</a:t>
+              <a:t>2021-12-09</a:t>
             </a:fld>
             <a:endParaRPr lang="ko-KR" altLang="en-US"/>
           </a:p>
@@ -1403,7 +1407,7 @@
           <a:p>
             <a:fld id="{C45A1C21-134E-40EB-8D47-CF3E42B81BA3}" type="datetimeFigureOut">
               <a:rPr lang="ko-KR" altLang="en-US" smtClean="0"/>
-              <a:t>2021-10-27</a:t>
+              <a:t>2021-12-09</a:t>
             </a:fld>
             <a:endParaRPr lang="ko-KR" altLang="en-US"/>
           </a:p>
@@ -1815,7 +1819,7 @@
           <a:p>
             <a:fld id="{C45A1C21-134E-40EB-8D47-CF3E42B81BA3}" type="datetimeFigureOut">
               <a:rPr lang="ko-KR" altLang="en-US" smtClean="0"/>
-              <a:t>2021-10-27</a:t>
+              <a:t>2021-12-09</a:t>
             </a:fld>
             <a:endParaRPr lang="ko-KR" altLang="en-US"/>
           </a:p>
@@ -1956,7 +1960,7 @@
           <a:p>
             <a:fld id="{C45A1C21-134E-40EB-8D47-CF3E42B81BA3}" type="datetimeFigureOut">
               <a:rPr lang="ko-KR" altLang="en-US" smtClean="0"/>
-              <a:t>2021-10-27</a:t>
+              <a:t>2021-12-09</a:t>
             </a:fld>
             <a:endParaRPr lang="ko-KR" altLang="en-US"/>
           </a:p>
@@ -2069,7 +2073,7 @@
           <a:p>
             <a:fld id="{C45A1C21-134E-40EB-8D47-CF3E42B81BA3}" type="datetimeFigureOut">
               <a:rPr lang="ko-KR" altLang="en-US" smtClean="0"/>
-              <a:t>2021-10-27</a:t>
+              <a:t>2021-12-09</a:t>
             </a:fld>
             <a:endParaRPr lang="ko-KR" altLang="en-US"/>
           </a:p>
@@ -2380,7 +2384,7 @@
           <a:p>
             <a:fld id="{C45A1C21-134E-40EB-8D47-CF3E42B81BA3}" type="datetimeFigureOut">
               <a:rPr lang="ko-KR" altLang="en-US" smtClean="0"/>
-              <a:t>2021-10-27</a:t>
+              <a:t>2021-12-09</a:t>
             </a:fld>
             <a:endParaRPr lang="ko-KR" altLang="en-US"/>
           </a:p>
@@ -2668,7 +2672,7 @@
           <a:p>
             <a:fld id="{C45A1C21-134E-40EB-8D47-CF3E42B81BA3}" type="datetimeFigureOut">
               <a:rPr lang="ko-KR" altLang="en-US" smtClean="0"/>
-              <a:t>2021-10-27</a:t>
+              <a:t>2021-12-09</a:t>
             </a:fld>
             <a:endParaRPr lang="ko-KR" altLang="en-US"/>
           </a:p>
@@ -2909,7 +2913,7 @@
           <a:p>
             <a:fld id="{C45A1C21-134E-40EB-8D47-CF3E42B81BA3}" type="datetimeFigureOut">
               <a:rPr lang="ko-KR" altLang="en-US" smtClean="0"/>
-              <a:t>2021-10-27</a:t>
+              <a:t>2021-12-09</a:t>
             </a:fld>
             <a:endParaRPr lang="ko-KR" altLang="en-US"/>
           </a:p>
@@ -5534,6 +5538,1381 @@
 </p:sld>
 </file>
 
+<file path=ppt/slides/slide2.xml><?xml version="1.0" encoding="utf-8"?>
+<p:sld xmlns:a="http://schemas.openxmlformats.org/drawingml/2006/main" xmlns:r="http://schemas.openxmlformats.org/officeDocument/2006/relationships" xmlns:p="http://schemas.openxmlformats.org/presentationml/2006/main">
+  <p:cSld>
+    <p:spTree>
+      <p:nvGrpSpPr>
+        <p:cNvPr id="1" name=""/>
+        <p:cNvGrpSpPr/>
+        <p:nvPr/>
+      </p:nvGrpSpPr>
+      <p:grpSpPr>
+        <a:xfrm>
+          <a:off x="0" y="0"/>
+          <a:ext cx="0" cy="0"/>
+          <a:chOff x="0" y="0"/>
+          <a:chExt cx="0" cy="0"/>
+        </a:xfrm>
+      </p:grpSpPr>
+      <p:sp>
+        <p:nvSpPr>
+          <p:cNvPr id="9" name="직사각형 8">
+            <a:extLst>
+              <a:ext uri="{FF2B5EF4-FFF2-40B4-BE49-F238E27FC236}">
+                <a16:creationId xmlns:a16="http://schemas.microsoft.com/office/drawing/2014/main" id="{33204D42-769B-4345-A235-69F2378115CA}"/>
+              </a:ext>
+            </a:extLst>
+          </p:cNvPr>
+          <p:cNvSpPr/>
+          <p:nvPr/>
+        </p:nvSpPr>
+        <p:spPr>
+          <a:xfrm>
+            <a:off x="606829" y="473825"/>
+            <a:ext cx="3241964" cy="656706"/>
+          </a:xfrm>
+          <a:prstGeom prst="rect">
+            <a:avLst/>
+          </a:prstGeom>
+        </p:spPr>
+        <p:style>
+          <a:lnRef idx="2">
+            <a:schemeClr val="accent1">
+              <a:shade val="50000"/>
+            </a:schemeClr>
+          </a:lnRef>
+          <a:fillRef idx="1">
+            <a:schemeClr val="accent1"/>
+          </a:fillRef>
+          <a:effectRef idx="0">
+            <a:schemeClr val="accent1"/>
+          </a:effectRef>
+          <a:fontRef idx="minor">
+            <a:schemeClr val="lt1"/>
+          </a:fontRef>
+        </p:style>
+        <p:txBody>
+          <a:bodyPr rtlCol="0" anchor="ctr"/>
+          <a:lstStyle/>
+          <a:p>
+            <a:pPr algn="ctr"/>
+            <a:r>
+              <a:rPr lang="ko-KR" altLang="en-US" sz="1200" dirty="0">
+                <a:latin typeface="나눔고딕" panose="020D0604000000000000" pitchFamily="50" charset="-127"/>
+                <a:ea typeface="나눔고딕" panose="020D0604000000000000" pitchFamily="50" charset="-127"/>
+              </a:rPr>
+              <a:t>연결 메뉴</a:t>
+            </a:r>
+          </a:p>
+        </p:txBody>
+      </p:sp>
+      <p:sp>
+        <p:nvSpPr>
+          <p:cNvPr id="41" name="직사각형 40">
+            <a:extLst>
+              <a:ext uri="{FF2B5EF4-FFF2-40B4-BE49-F238E27FC236}">
+                <a16:creationId xmlns:a16="http://schemas.microsoft.com/office/drawing/2014/main" id="{59C4B2C8-F040-4398-A545-5C8C0A411CD1}"/>
+              </a:ext>
+            </a:extLst>
+          </p:cNvPr>
+          <p:cNvSpPr/>
+          <p:nvPr/>
+        </p:nvSpPr>
+        <p:spPr>
+          <a:xfrm>
+            <a:off x="606829" y="1510144"/>
+            <a:ext cx="3241964" cy="656706"/>
+          </a:xfrm>
+          <a:prstGeom prst="rect">
+            <a:avLst/>
+          </a:prstGeom>
+        </p:spPr>
+        <p:style>
+          <a:lnRef idx="2">
+            <a:schemeClr val="accent1">
+              <a:shade val="50000"/>
+            </a:schemeClr>
+          </a:lnRef>
+          <a:fillRef idx="1">
+            <a:schemeClr val="accent1"/>
+          </a:fillRef>
+          <a:effectRef idx="0">
+            <a:schemeClr val="accent1"/>
+          </a:effectRef>
+          <a:fontRef idx="minor">
+            <a:schemeClr val="lt1"/>
+          </a:fontRef>
+        </p:style>
+        <p:txBody>
+          <a:bodyPr rtlCol="0" anchor="ctr"/>
+          <a:lstStyle/>
+          <a:p>
+            <a:pPr algn="ctr"/>
+            <a:r>
+              <a:rPr lang="ko-KR" altLang="en-US" sz="1200" dirty="0">
+                <a:latin typeface="나눔고딕" panose="020D0604000000000000" pitchFamily="50" charset="-127"/>
+                <a:ea typeface="나눔고딕" panose="020D0604000000000000" pitchFamily="50" charset="-127"/>
+              </a:rPr>
+              <a:t>연결 </a:t>
+            </a:r>
+            <a:r>
+              <a:rPr lang="en-US" altLang="ko-KR" sz="1200" dirty="0">
+                <a:latin typeface="나눔고딕" panose="020D0604000000000000" pitchFamily="50" charset="-127"/>
+                <a:ea typeface="나눔고딕" panose="020D0604000000000000" pitchFamily="50" charset="-127"/>
+              </a:rPr>
+              <a:t>Popup</a:t>
+            </a:r>
+            <a:endParaRPr lang="ko-KR" altLang="en-US" sz="1200" dirty="0">
+              <a:latin typeface="나눔고딕" panose="020D0604000000000000" pitchFamily="50" charset="-127"/>
+              <a:ea typeface="나눔고딕" panose="020D0604000000000000" pitchFamily="50" charset="-127"/>
+            </a:endParaRPr>
+          </a:p>
+        </p:txBody>
+      </p:sp>
+      <p:sp>
+        <p:nvSpPr>
+          <p:cNvPr id="42" name="직사각형 41">
+            <a:extLst>
+              <a:ext uri="{FF2B5EF4-FFF2-40B4-BE49-F238E27FC236}">
+                <a16:creationId xmlns:a16="http://schemas.microsoft.com/office/drawing/2014/main" id="{D9DB538D-374A-495A-8AA4-4A81EECA5CE8}"/>
+              </a:ext>
+            </a:extLst>
+          </p:cNvPr>
+          <p:cNvSpPr/>
+          <p:nvPr/>
+        </p:nvSpPr>
+        <p:spPr>
+          <a:xfrm>
+            <a:off x="606830" y="2565861"/>
+            <a:ext cx="964276" cy="656706"/>
+          </a:xfrm>
+          <a:prstGeom prst="rect">
+            <a:avLst/>
+          </a:prstGeom>
+        </p:spPr>
+        <p:style>
+          <a:lnRef idx="2">
+            <a:schemeClr val="accent1">
+              <a:shade val="50000"/>
+            </a:schemeClr>
+          </a:lnRef>
+          <a:fillRef idx="1">
+            <a:schemeClr val="accent1"/>
+          </a:fillRef>
+          <a:effectRef idx="0">
+            <a:schemeClr val="accent1"/>
+          </a:effectRef>
+          <a:fontRef idx="minor">
+            <a:schemeClr val="lt1"/>
+          </a:fontRef>
+        </p:style>
+        <p:txBody>
+          <a:bodyPr rtlCol="0" anchor="ctr"/>
+          <a:lstStyle/>
+          <a:p>
+            <a:pPr algn="ctr"/>
+            <a:r>
+              <a:rPr lang="ko-KR" altLang="en-US" sz="1200" dirty="0">
+                <a:latin typeface="나눔고딕" panose="020D0604000000000000" pitchFamily="50" charset="-127"/>
+                <a:ea typeface="나눔고딕" panose="020D0604000000000000" pitchFamily="50" charset="-127"/>
+              </a:rPr>
+              <a:t>연결 완료</a:t>
+            </a:r>
+          </a:p>
+        </p:txBody>
+      </p:sp>
+      <p:cxnSp>
+        <p:nvCxnSpPr>
+          <p:cNvPr id="11" name="직선 화살표 연결선 10">
+            <a:extLst>
+              <a:ext uri="{FF2B5EF4-FFF2-40B4-BE49-F238E27FC236}">
+                <a16:creationId xmlns:a16="http://schemas.microsoft.com/office/drawing/2014/main" id="{6D0E273C-CCAF-43D7-8743-E57EE3ACA297}"/>
+              </a:ext>
+            </a:extLst>
+          </p:cNvPr>
+          <p:cNvCxnSpPr>
+            <a:stCxn id="9" idx="2"/>
+            <a:endCxn id="41" idx="0"/>
+          </p:cNvCxnSpPr>
+          <p:nvPr/>
+        </p:nvCxnSpPr>
+        <p:spPr>
+          <a:xfrm>
+            <a:off x="2227811" y="1130531"/>
+            <a:ext cx="0" cy="379613"/>
+          </a:xfrm>
+          <a:prstGeom prst="straightConnector1">
+            <a:avLst/>
+          </a:prstGeom>
+          <a:ln>
+            <a:tailEnd type="triangle"/>
+          </a:ln>
+        </p:spPr>
+        <p:style>
+          <a:lnRef idx="1">
+            <a:schemeClr val="accent1"/>
+          </a:lnRef>
+          <a:fillRef idx="0">
+            <a:schemeClr val="accent1"/>
+          </a:fillRef>
+          <a:effectRef idx="0">
+            <a:schemeClr val="accent1"/>
+          </a:effectRef>
+          <a:fontRef idx="minor">
+            <a:schemeClr val="tx1"/>
+          </a:fontRef>
+        </p:style>
+      </p:cxnSp>
+      <p:sp>
+        <p:nvSpPr>
+          <p:cNvPr id="45" name="직사각형 44">
+            <a:extLst>
+              <a:ext uri="{FF2B5EF4-FFF2-40B4-BE49-F238E27FC236}">
+                <a16:creationId xmlns:a16="http://schemas.microsoft.com/office/drawing/2014/main" id="{32B3EF79-3791-4778-B253-9AD648A14042}"/>
+              </a:ext>
+            </a:extLst>
+          </p:cNvPr>
+          <p:cNvSpPr/>
+          <p:nvPr/>
+        </p:nvSpPr>
+        <p:spPr>
+          <a:xfrm>
+            <a:off x="2884518" y="2565861"/>
+            <a:ext cx="964276" cy="656706"/>
+          </a:xfrm>
+          <a:prstGeom prst="rect">
+            <a:avLst/>
+          </a:prstGeom>
+        </p:spPr>
+        <p:style>
+          <a:lnRef idx="2">
+            <a:schemeClr val="accent1">
+              <a:shade val="50000"/>
+            </a:schemeClr>
+          </a:lnRef>
+          <a:fillRef idx="1">
+            <a:schemeClr val="accent1"/>
+          </a:fillRef>
+          <a:effectRef idx="0">
+            <a:schemeClr val="accent1"/>
+          </a:effectRef>
+          <a:fontRef idx="minor">
+            <a:schemeClr val="lt1"/>
+          </a:fontRef>
+        </p:style>
+        <p:txBody>
+          <a:bodyPr rtlCol="0" anchor="ctr"/>
+          <a:lstStyle/>
+          <a:p>
+            <a:pPr algn="ctr"/>
+            <a:r>
+              <a:rPr lang="ko-KR" altLang="en-US" sz="1200" dirty="0">
+                <a:latin typeface="나눔고딕" panose="020D0604000000000000" pitchFamily="50" charset="-127"/>
+                <a:ea typeface="나눔고딕" panose="020D0604000000000000" pitchFamily="50" charset="-127"/>
+              </a:rPr>
+              <a:t>연결 테스트</a:t>
+            </a:r>
+          </a:p>
+        </p:txBody>
+      </p:sp>
+      <p:cxnSp>
+        <p:nvCxnSpPr>
+          <p:cNvPr id="46" name="직선 화살표 연결선 45">
+            <a:extLst>
+              <a:ext uri="{FF2B5EF4-FFF2-40B4-BE49-F238E27FC236}">
+                <a16:creationId xmlns:a16="http://schemas.microsoft.com/office/drawing/2014/main" id="{F0B09107-5D76-4DBF-B376-74B0059941CB}"/>
+              </a:ext>
+            </a:extLst>
+          </p:cNvPr>
+          <p:cNvCxnSpPr>
+            <a:cxnSpLocks/>
+            <a:stCxn id="41" idx="2"/>
+            <a:endCxn id="42" idx="0"/>
+          </p:cNvCxnSpPr>
+          <p:nvPr/>
+        </p:nvCxnSpPr>
+        <p:spPr>
+          <a:xfrm flipH="1">
+            <a:off x="1088968" y="2166850"/>
+            <a:ext cx="1138843" cy="399011"/>
+          </a:xfrm>
+          <a:prstGeom prst="straightConnector1">
+            <a:avLst/>
+          </a:prstGeom>
+          <a:ln>
+            <a:tailEnd type="triangle"/>
+          </a:ln>
+        </p:spPr>
+        <p:style>
+          <a:lnRef idx="1">
+            <a:schemeClr val="accent1"/>
+          </a:lnRef>
+          <a:fillRef idx="0">
+            <a:schemeClr val="accent1"/>
+          </a:fillRef>
+          <a:effectRef idx="0">
+            <a:schemeClr val="accent1"/>
+          </a:effectRef>
+          <a:fontRef idx="minor">
+            <a:schemeClr val="tx1"/>
+          </a:fontRef>
+        </p:style>
+      </p:cxnSp>
+      <p:cxnSp>
+        <p:nvCxnSpPr>
+          <p:cNvPr id="49" name="직선 화살표 연결선 48">
+            <a:extLst>
+              <a:ext uri="{FF2B5EF4-FFF2-40B4-BE49-F238E27FC236}">
+                <a16:creationId xmlns:a16="http://schemas.microsoft.com/office/drawing/2014/main" id="{7699D496-9506-41B9-9DF9-C80BD674AFA6}"/>
+              </a:ext>
+            </a:extLst>
+          </p:cNvPr>
+          <p:cNvCxnSpPr>
+            <a:cxnSpLocks/>
+            <a:stCxn id="41" idx="2"/>
+            <a:endCxn id="45" idx="0"/>
+          </p:cNvCxnSpPr>
+          <p:nvPr/>
+        </p:nvCxnSpPr>
+        <p:spPr>
+          <a:xfrm>
+            <a:off x="2227811" y="2166850"/>
+            <a:ext cx="1138845" cy="399011"/>
+          </a:xfrm>
+          <a:prstGeom prst="straightConnector1">
+            <a:avLst/>
+          </a:prstGeom>
+          <a:ln>
+            <a:tailEnd type="triangle"/>
+          </a:ln>
+        </p:spPr>
+        <p:style>
+          <a:lnRef idx="1">
+            <a:schemeClr val="accent1"/>
+          </a:lnRef>
+          <a:fillRef idx="0">
+            <a:schemeClr val="accent1"/>
+          </a:fillRef>
+          <a:effectRef idx="0">
+            <a:schemeClr val="accent1"/>
+          </a:effectRef>
+          <a:fontRef idx="minor">
+            <a:schemeClr val="tx1"/>
+          </a:fontRef>
+        </p:style>
+      </p:cxnSp>
+      <p:sp>
+        <p:nvSpPr>
+          <p:cNvPr id="55" name="직사각형 54">
+            <a:extLst>
+              <a:ext uri="{FF2B5EF4-FFF2-40B4-BE49-F238E27FC236}">
+                <a16:creationId xmlns:a16="http://schemas.microsoft.com/office/drawing/2014/main" id="{64FD88DA-FEB8-4EDE-8A55-895D3B18F993}"/>
+              </a:ext>
+            </a:extLst>
+          </p:cNvPr>
+          <p:cNvSpPr/>
+          <p:nvPr/>
+        </p:nvSpPr>
+        <p:spPr>
+          <a:xfrm>
+            <a:off x="606828" y="3635434"/>
+            <a:ext cx="964277" cy="656706"/>
+          </a:xfrm>
+          <a:prstGeom prst="rect">
+            <a:avLst/>
+          </a:prstGeom>
+        </p:spPr>
+        <p:style>
+          <a:lnRef idx="2">
+            <a:schemeClr val="accent1">
+              <a:shade val="50000"/>
+            </a:schemeClr>
+          </a:lnRef>
+          <a:fillRef idx="1">
+            <a:schemeClr val="accent1"/>
+          </a:fillRef>
+          <a:effectRef idx="0">
+            <a:schemeClr val="accent1"/>
+          </a:effectRef>
+          <a:fontRef idx="minor">
+            <a:schemeClr val="lt1"/>
+          </a:fontRef>
+        </p:style>
+        <p:txBody>
+          <a:bodyPr rtlCol="0" anchor="ctr"/>
+          <a:lstStyle/>
+          <a:p>
+            <a:pPr algn="ctr"/>
+            <a:r>
+              <a:rPr lang="ko-KR" altLang="en-US" sz="1200" dirty="0">
+                <a:latin typeface="나눔고딕" panose="020D0604000000000000" pitchFamily="50" charset="-127"/>
+                <a:ea typeface="나눔고딕" panose="020D0604000000000000" pitchFamily="50" charset="-127"/>
+              </a:rPr>
+              <a:t>탐색 창 </a:t>
+            </a:r>
+            <a:r>
+              <a:rPr lang="en-US" altLang="ko-KR" sz="1200" dirty="0">
+                <a:latin typeface="나눔고딕" panose="020D0604000000000000" pitchFamily="50" charset="-127"/>
+                <a:ea typeface="나눔고딕" panose="020D0604000000000000" pitchFamily="50" charset="-127"/>
+              </a:rPr>
+              <a:t>List </a:t>
+            </a:r>
+            <a:r>
+              <a:rPr lang="ko-KR" altLang="en-US" sz="1200" dirty="0">
+                <a:latin typeface="나눔고딕" panose="020D0604000000000000" pitchFamily="50" charset="-127"/>
+                <a:ea typeface="나눔고딕" panose="020D0604000000000000" pitchFamily="50" charset="-127"/>
+              </a:rPr>
+              <a:t>추가</a:t>
+            </a:r>
+          </a:p>
+        </p:txBody>
+      </p:sp>
+      <p:cxnSp>
+        <p:nvCxnSpPr>
+          <p:cNvPr id="56" name="직선 화살표 연결선 55">
+            <a:extLst>
+              <a:ext uri="{FF2B5EF4-FFF2-40B4-BE49-F238E27FC236}">
+                <a16:creationId xmlns:a16="http://schemas.microsoft.com/office/drawing/2014/main" id="{2EBF0475-06C0-4D63-B1BB-CDD6708D480E}"/>
+              </a:ext>
+            </a:extLst>
+          </p:cNvPr>
+          <p:cNvCxnSpPr>
+            <a:cxnSpLocks/>
+            <a:stCxn id="42" idx="2"/>
+            <a:endCxn id="55" idx="0"/>
+          </p:cNvCxnSpPr>
+          <p:nvPr/>
+        </p:nvCxnSpPr>
+        <p:spPr>
+          <a:xfrm flipH="1">
+            <a:off x="1088967" y="3222567"/>
+            <a:ext cx="1" cy="412867"/>
+          </a:xfrm>
+          <a:prstGeom prst="straightConnector1">
+            <a:avLst/>
+          </a:prstGeom>
+          <a:ln>
+            <a:tailEnd type="triangle"/>
+          </a:ln>
+        </p:spPr>
+        <p:style>
+          <a:lnRef idx="1">
+            <a:schemeClr val="accent1"/>
+          </a:lnRef>
+          <a:fillRef idx="0">
+            <a:schemeClr val="accent1"/>
+          </a:fillRef>
+          <a:effectRef idx="0">
+            <a:schemeClr val="accent1"/>
+          </a:effectRef>
+          <a:fontRef idx="minor">
+            <a:schemeClr val="tx1"/>
+          </a:fontRef>
+        </p:style>
+      </p:cxnSp>
+      <p:sp>
+        <p:nvSpPr>
+          <p:cNvPr id="62" name="직사각형 61">
+            <a:extLst>
+              <a:ext uri="{FF2B5EF4-FFF2-40B4-BE49-F238E27FC236}">
+                <a16:creationId xmlns:a16="http://schemas.microsoft.com/office/drawing/2014/main" id="{524A9FB9-DC2D-4049-AEE7-D7C130FC38C3}"/>
+              </a:ext>
+            </a:extLst>
+          </p:cNvPr>
+          <p:cNvSpPr/>
+          <p:nvPr/>
+        </p:nvSpPr>
+        <p:spPr>
+          <a:xfrm>
+            <a:off x="1745673" y="2561707"/>
+            <a:ext cx="964276" cy="656706"/>
+          </a:xfrm>
+          <a:prstGeom prst="rect">
+            <a:avLst/>
+          </a:prstGeom>
+        </p:spPr>
+        <p:style>
+          <a:lnRef idx="2">
+            <a:schemeClr val="accent1">
+              <a:shade val="50000"/>
+            </a:schemeClr>
+          </a:lnRef>
+          <a:fillRef idx="1">
+            <a:schemeClr val="accent1"/>
+          </a:fillRef>
+          <a:effectRef idx="0">
+            <a:schemeClr val="accent1"/>
+          </a:effectRef>
+          <a:fontRef idx="minor">
+            <a:schemeClr val="lt1"/>
+          </a:fontRef>
+        </p:style>
+        <p:txBody>
+          <a:bodyPr rtlCol="0" anchor="ctr"/>
+          <a:lstStyle/>
+          <a:p>
+            <a:pPr algn="ctr"/>
+            <a:r>
+              <a:rPr lang="ko-KR" altLang="en-US" sz="1200" dirty="0">
+                <a:latin typeface="나눔고딕" panose="020D0604000000000000" pitchFamily="50" charset="-127"/>
+                <a:ea typeface="나눔고딕" panose="020D0604000000000000" pitchFamily="50" charset="-127"/>
+              </a:rPr>
+              <a:t>연결 실패</a:t>
+            </a:r>
+          </a:p>
+        </p:txBody>
+      </p:sp>
+      <p:cxnSp>
+        <p:nvCxnSpPr>
+          <p:cNvPr id="66" name="직선 화살표 연결선 65">
+            <a:extLst>
+              <a:ext uri="{FF2B5EF4-FFF2-40B4-BE49-F238E27FC236}">
+                <a16:creationId xmlns:a16="http://schemas.microsoft.com/office/drawing/2014/main" id="{3491CFEF-E6C6-4443-9F4F-033C278CF373}"/>
+              </a:ext>
+            </a:extLst>
+          </p:cNvPr>
+          <p:cNvCxnSpPr>
+            <a:cxnSpLocks/>
+            <a:stCxn id="41" idx="2"/>
+            <a:endCxn id="62" idx="0"/>
+          </p:cNvCxnSpPr>
+          <p:nvPr/>
+        </p:nvCxnSpPr>
+        <p:spPr>
+          <a:xfrm>
+            <a:off x="2227811" y="2166850"/>
+            <a:ext cx="0" cy="394857"/>
+          </a:xfrm>
+          <a:prstGeom prst="straightConnector1">
+            <a:avLst/>
+          </a:prstGeom>
+          <a:ln>
+            <a:tailEnd type="triangle"/>
+          </a:ln>
+        </p:spPr>
+        <p:style>
+          <a:lnRef idx="1">
+            <a:schemeClr val="accent1"/>
+          </a:lnRef>
+          <a:fillRef idx="0">
+            <a:schemeClr val="accent1"/>
+          </a:fillRef>
+          <a:effectRef idx="0">
+            <a:schemeClr val="accent1"/>
+          </a:effectRef>
+          <a:fontRef idx="minor">
+            <a:schemeClr val="tx1"/>
+          </a:fontRef>
+        </p:style>
+      </p:cxnSp>
+      <p:sp>
+        <p:nvSpPr>
+          <p:cNvPr id="67" name="직사각형 66">
+            <a:extLst>
+              <a:ext uri="{FF2B5EF4-FFF2-40B4-BE49-F238E27FC236}">
+                <a16:creationId xmlns:a16="http://schemas.microsoft.com/office/drawing/2014/main" id="{087A7521-1C1E-4D09-A9DF-D9EF871B5A4C}"/>
+              </a:ext>
+            </a:extLst>
+          </p:cNvPr>
+          <p:cNvSpPr/>
+          <p:nvPr/>
+        </p:nvSpPr>
+        <p:spPr>
+          <a:xfrm>
+            <a:off x="1745673" y="3635434"/>
+            <a:ext cx="964276" cy="656706"/>
+          </a:xfrm>
+          <a:prstGeom prst="rect">
+            <a:avLst/>
+          </a:prstGeom>
+        </p:spPr>
+        <p:style>
+          <a:lnRef idx="2">
+            <a:schemeClr val="accent1">
+              <a:shade val="50000"/>
+            </a:schemeClr>
+          </a:lnRef>
+          <a:fillRef idx="1">
+            <a:schemeClr val="accent1"/>
+          </a:fillRef>
+          <a:effectRef idx="0">
+            <a:schemeClr val="accent1"/>
+          </a:effectRef>
+          <a:fontRef idx="minor">
+            <a:schemeClr val="lt1"/>
+          </a:fontRef>
+        </p:style>
+        <p:txBody>
+          <a:bodyPr rtlCol="0" anchor="ctr"/>
+          <a:lstStyle/>
+          <a:p>
+            <a:pPr algn="ctr"/>
+            <a:r>
+              <a:rPr lang="ko-KR" altLang="en-US" sz="1200" dirty="0">
+                <a:latin typeface="나눔고딕" panose="020D0604000000000000" pitchFamily="50" charset="-127"/>
+                <a:ea typeface="나눔고딕" panose="020D0604000000000000" pitchFamily="50" charset="-127"/>
+              </a:rPr>
+              <a:t>연결 실패</a:t>
+            </a:r>
+            <a:endParaRPr lang="en-US" altLang="ko-KR" sz="1200" dirty="0">
+              <a:latin typeface="나눔고딕" panose="020D0604000000000000" pitchFamily="50" charset="-127"/>
+              <a:ea typeface="나눔고딕" panose="020D0604000000000000" pitchFamily="50" charset="-127"/>
+            </a:endParaRPr>
+          </a:p>
+          <a:p>
+            <a:pPr algn="ctr"/>
+            <a:r>
+              <a:rPr lang="en-US" altLang="ko-KR" sz="1200" dirty="0">
+                <a:latin typeface="나눔고딕" panose="020D0604000000000000" pitchFamily="50" charset="-127"/>
+                <a:ea typeface="나눔고딕" panose="020D0604000000000000" pitchFamily="50" charset="-127"/>
+              </a:rPr>
+              <a:t>Popup</a:t>
+            </a:r>
+            <a:endParaRPr lang="ko-KR" altLang="en-US" sz="1200" dirty="0">
+              <a:latin typeface="나눔고딕" panose="020D0604000000000000" pitchFamily="50" charset="-127"/>
+              <a:ea typeface="나눔고딕" panose="020D0604000000000000" pitchFamily="50" charset="-127"/>
+            </a:endParaRPr>
+          </a:p>
+        </p:txBody>
+      </p:sp>
+      <p:cxnSp>
+        <p:nvCxnSpPr>
+          <p:cNvPr id="68" name="직선 화살표 연결선 67">
+            <a:extLst>
+              <a:ext uri="{FF2B5EF4-FFF2-40B4-BE49-F238E27FC236}">
+                <a16:creationId xmlns:a16="http://schemas.microsoft.com/office/drawing/2014/main" id="{3197485C-FDEE-4B33-B034-8ABB0C7A4FE6}"/>
+              </a:ext>
+            </a:extLst>
+          </p:cNvPr>
+          <p:cNvCxnSpPr>
+            <a:cxnSpLocks/>
+            <a:stCxn id="62" idx="2"/>
+            <a:endCxn id="67" idx="0"/>
+          </p:cNvCxnSpPr>
+          <p:nvPr/>
+        </p:nvCxnSpPr>
+        <p:spPr>
+          <a:xfrm>
+            <a:off x="2227811" y="3218413"/>
+            <a:ext cx="0" cy="417021"/>
+          </a:xfrm>
+          <a:prstGeom prst="straightConnector1">
+            <a:avLst/>
+          </a:prstGeom>
+          <a:ln>
+            <a:tailEnd type="triangle"/>
+          </a:ln>
+        </p:spPr>
+        <p:style>
+          <a:lnRef idx="1">
+            <a:schemeClr val="accent1"/>
+          </a:lnRef>
+          <a:fillRef idx="0">
+            <a:schemeClr val="accent1"/>
+          </a:fillRef>
+          <a:effectRef idx="0">
+            <a:schemeClr val="accent1"/>
+          </a:effectRef>
+          <a:fontRef idx="minor">
+            <a:schemeClr val="tx1"/>
+          </a:fontRef>
+        </p:style>
+      </p:cxnSp>
+      <p:cxnSp>
+        <p:nvCxnSpPr>
+          <p:cNvPr id="71" name="직선 화살표 연결선 70">
+            <a:extLst>
+              <a:ext uri="{FF2B5EF4-FFF2-40B4-BE49-F238E27FC236}">
+                <a16:creationId xmlns:a16="http://schemas.microsoft.com/office/drawing/2014/main" id="{EEEE41AE-1E6F-45AB-B574-C4847764127D}"/>
+              </a:ext>
+            </a:extLst>
+          </p:cNvPr>
+          <p:cNvCxnSpPr>
+            <a:cxnSpLocks/>
+            <a:stCxn id="45" idx="2"/>
+            <a:endCxn id="72" idx="0"/>
+          </p:cNvCxnSpPr>
+          <p:nvPr/>
+        </p:nvCxnSpPr>
+        <p:spPr>
+          <a:xfrm flipH="1">
+            <a:off x="3366654" y="3222567"/>
+            <a:ext cx="2" cy="399010"/>
+          </a:xfrm>
+          <a:prstGeom prst="straightConnector1">
+            <a:avLst/>
+          </a:prstGeom>
+          <a:ln>
+            <a:tailEnd type="triangle"/>
+          </a:ln>
+        </p:spPr>
+        <p:style>
+          <a:lnRef idx="1">
+            <a:schemeClr val="accent1"/>
+          </a:lnRef>
+          <a:fillRef idx="0">
+            <a:schemeClr val="accent1"/>
+          </a:fillRef>
+          <a:effectRef idx="0">
+            <a:schemeClr val="accent1"/>
+          </a:effectRef>
+          <a:fontRef idx="minor">
+            <a:schemeClr val="tx1"/>
+          </a:fontRef>
+        </p:style>
+      </p:cxnSp>
+      <p:sp>
+        <p:nvSpPr>
+          <p:cNvPr id="72" name="직사각형 71">
+            <a:extLst>
+              <a:ext uri="{FF2B5EF4-FFF2-40B4-BE49-F238E27FC236}">
+                <a16:creationId xmlns:a16="http://schemas.microsoft.com/office/drawing/2014/main" id="{02995BC4-58BD-4512-8D7B-49706D48712E}"/>
+              </a:ext>
+            </a:extLst>
+          </p:cNvPr>
+          <p:cNvSpPr/>
+          <p:nvPr/>
+        </p:nvSpPr>
+        <p:spPr>
+          <a:xfrm>
+            <a:off x="2884516" y="3621577"/>
+            <a:ext cx="964276" cy="656706"/>
+          </a:xfrm>
+          <a:prstGeom prst="rect">
+            <a:avLst/>
+          </a:prstGeom>
+        </p:spPr>
+        <p:style>
+          <a:lnRef idx="2">
+            <a:schemeClr val="accent1">
+              <a:shade val="50000"/>
+            </a:schemeClr>
+          </a:lnRef>
+          <a:fillRef idx="1">
+            <a:schemeClr val="accent1"/>
+          </a:fillRef>
+          <a:effectRef idx="0">
+            <a:schemeClr val="accent1"/>
+          </a:effectRef>
+          <a:fontRef idx="minor">
+            <a:schemeClr val="lt1"/>
+          </a:fontRef>
+        </p:style>
+        <p:txBody>
+          <a:bodyPr rtlCol="0" anchor="ctr"/>
+          <a:lstStyle/>
+          <a:p>
+            <a:pPr algn="ctr"/>
+            <a:r>
+              <a:rPr lang="ko-KR" altLang="en-US" sz="1200" dirty="0">
+                <a:latin typeface="나눔고딕" panose="020D0604000000000000" pitchFamily="50" charset="-127"/>
+                <a:ea typeface="나눔고딕" panose="020D0604000000000000" pitchFamily="50" charset="-127"/>
+              </a:rPr>
+              <a:t>테스트 결과</a:t>
+            </a:r>
+            <a:endParaRPr lang="en-US" altLang="ko-KR" sz="1200" dirty="0">
+              <a:latin typeface="나눔고딕" panose="020D0604000000000000" pitchFamily="50" charset="-127"/>
+              <a:ea typeface="나눔고딕" panose="020D0604000000000000" pitchFamily="50" charset="-127"/>
+            </a:endParaRPr>
+          </a:p>
+          <a:p>
+            <a:pPr algn="ctr"/>
+            <a:r>
+              <a:rPr lang="en-US" altLang="ko-KR" sz="1200" dirty="0">
+                <a:latin typeface="나눔고딕" panose="020D0604000000000000" pitchFamily="50" charset="-127"/>
+                <a:ea typeface="나눔고딕" panose="020D0604000000000000" pitchFamily="50" charset="-127"/>
+              </a:rPr>
+              <a:t>Popup</a:t>
+            </a:r>
+          </a:p>
+        </p:txBody>
+      </p:sp>
+    </p:spTree>
+    <p:extLst>
+      <p:ext uri="{BB962C8B-B14F-4D97-AF65-F5344CB8AC3E}">
+        <p14:creationId xmlns:p14="http://schemas.microsoft.com/office/powerpoint/2010/main" val="3684834579"/>
+      </p:ext>
+    </p:extLst>
+  </p:cSld>
+  <p:clrMapOvr>
+    <a:masterClrMapping/>
+  </p:clrMapOvr>
+</p:sld>
+</file>
+
+<file path=ppt/slides/slide3.xml><?xml version="1.0" encoding="utf-8"?>
+<p:sld xmlns:a="http://schemas.openxmlformats.org/drawingml/2006/main" xmlns:r="http://schemas.openxmlformats.org/officeDocument/2006/relationships" xmlns:p="http://schemas.openxmlformats.org/presentationml/2006/main">
+  <p:cSld>
+    <p:spTree>
+      <p:nvGrpSpPr>
+        <p:cNvPr id="1" name=""/>
+        <p:cNvGrpSpPr/>
+        <p:nvPr/>
+      </p:nvGrpSpPr>
+      <p:grpSpPr>
+        <a:xfrm>
+          <a:off x="0" y="0"/>
+          <a:ext cx="0" cy="0"/>
+          <a:chOff x="0" y="0"/>
+          <a:chExt cx="0" cy="0"/>
+        </a:xfrm>
+      </p:grpSpPr>
+      <p:pic>
+        <p:nvPicPr>
+          <p:cNvPr id="30" name="그림 29">
+            <a:extLst>
+              <a:ext uri="{FF2B5EF4-FFF2-40B4-BE49-F238E27FC236}">
+                <a16:creationId xmlns:a16="http://schemas.microsoft.com/office/drawing/2014/main" id="{31FA68A9-4863-4417-A94F-1BF0D6C64302}"/>
+              </a:ext>
+            </a:extLst>
+          </p:cNvPr>
+          <p:cNvPicPr>
+            <a:picLocks noChangeAspect="1"/>
+          </p:cNvPicPr>
+          <p:nvPr/>
+        </p:nvPicPr>
+        <p:blipFill>
+          <a:blip r:embed="rId2"/>
+          <a:stretch>
+            <a:fillRect/>
+          </a:stretch>
+        </p:blipFill>
+        <p:spPr>
+          <a:xfrm>
+            <a:off x="889779" y="1132724"/>
+            <a:ext cx="2864485" cy="2458374"/>
+          </a:xfrm>
+          <a:prstGeom prst="rect">
+            <a:avLst/>
+          </a:prstGeom>
+        </p:spPr>
+      </p:pic>
+    </p:spTree>
+    <p:extLst>
+      <p:ext uri="{BB962C8B-B14F-4D97-AF65-F5344CB8AC3E}">
+        <p14:creationId xmlns:p14="http://schemas.microsoft.com/office/powerpoint/2010/main" val="854754756"/>
+      </p:ext>
+    </p:extLst>
+  </p:cSld>
+  <p:clrMapOvr>
+    <a:masterClrMapping/>
+  </p:clrMapOvr>
+</p:sld>
+</file>
+
+<file path=ppt/slides/slide4.xml><?xml version="1.0" encoding="utf-8"?>
+<p:sld xmlns:a="http://schemas.openxmlformats.org/drawingml/2006/main" xmlns:r="http://schemas.openxmlformats.org/officeDocument/2006/relationships" xmlns:p="http://schemas.openxmlformats.org/presentationml/2006/main">
+  <p:cSld>
+    <p:spTree>
+      <p:nvGrpSpPr>
+        <p:cNvPr id="1" name=""/>
+        <p:cNvGrpSpPr/>
+        <p:nvPr/>
+      </p:nvGrpSpPr>
+      <p:grpSpPr>
+        <a:xfrm>
+          <a:off x="0" y="0"/>
+          <a:ext cx="0" cy="0"/>
+          <a:chOff x="0" y="0"/>
+          <a:chExt cx="0" cy="0"/>
+        </a:xfrm>
+      </p:grpSpPr>
+      <p:sp>
+        <p:nvSpPr>
+          <p:cNvPr id="9" name="직사각형 8">
+            <a:extLst>
+              <a:ext uri="{FF2B5EF4-FFF2-40B4-BE49-F238E27FC236}">
+                <a16:creationId xmlns:a16="http://schemas.microsoft.com/office/drawing/2014/main" id="{33204D42-769B-4345-A235-69F2378115CA}"/>
+              </a:ext>
+            </a:extLst>
+          </p:cNvPr>
+          <p:cNvSpPr/>
+          <p:nvPr/>
+        </p:nvSpPr>
+        <p:spPr>
+          <a:xfrm>
+            <a:off x="606829" y="473825"/>
+            <a:ext cx="3241964" cy="656706"/>
+          </a:xfrm>
+          <a:prstGeom prst="rect">
+            <a:avLst/>
+          </a:prstGeom>
+        </p:spPr>
+        <p:style>
+          <a:lnRef idx="2">
+            <a:schemeClr val="accent1">
+              <a:shade val="50000"/>
+            </a:schemeClr>
+          </a:lnRef>
+          <a:fillRef idx="1">
+            <a:schemeClr val="accent1"/>
+          </a:fillRef>
+          <a:effectRef idx="0">
+            <a:schemeClr val="accent1"/>
+          </a:effectRef>
+          <a:fontRef idx="minor">
+            <a:schemeClr val="lt1"/>
+          </a:fontRef>
+        </p:style>
+        <p:txBody>
+          <a:bodyPr rtlCol="0" anchor="ctr"/>
+          <a:lstStyle/>
+          <a:p>
+            <a:pPr algn="ctr"/>
+            <a:r>
+              <a:rPr lang="ko-KR" altLang="en-US" sz="1200" dirty="0">
+                <a:latin typeface="나눔고딕" panose="020D0604000000000000" pitchFamily="50" charset="-127"/>
+                <a:ea typeface="나눔고딕" panose="020D0604000000000000" pitchFamily="50" charset="-127"/>
+              </a:rPr>
+              <a:t>질의창에서 질의 실행</a:t>
+            </a:r>
+          </a:p>
+        </p:txBody>
+      </p:sp>
+      <p:sp>
+        <p:nvSpPr>
+          <p:cNvPr id="41" name="직사각형 40">
+            <a:extLst>
+              <a:ext uri="{FF2B5EF4-FFF2-40B4-BE49-F238E27FC236}">
+                <a16:creationId xmlns:a16="http://schemas.microsoft.com/office/drawing/2014/main" id="{59C4B2C8-F040-4398-A545-5C8C0A411CD1}"/>
+              </a:ext>
+            </a:extLst>
+          </p:cNvPr>
+          <p:cNvSpPr/>
+          <p:nvPr/>
+        </p:nvSpPr>
+        <p:spPr>
+          <a:xfrm>
+            <a:off x="606829" y="1510144"/>
+            <a:ext cx="3241964" cy="656706"/>
+          </a:xfrm>
+          <a:prstGeom prst="rect">
+            <a:avLst/>
+          </a:prstGeom>
+        </p:spPr>
+        <p:style>
+          <a:lnRef idx="2">
+            <a:schemeClr val="accent1">
+              <a:shade val="50000"/>
+            </a:schemeClr>
+          </a:lnRef>
+          <a:fillRef idx="1">
+            <a:schemeClr val="accent1"/>
+          </a:fillRef>
+          <a:effectRef idx="0">
+            <a:schemeClr val="accent1"/>
+          </a:effectRef>
+          <a:fontRef idx="minor">
+            <a:schemeClr val="lt1"/>
+          </a:fontRef>
+        </p:style>
+        <p:txBody>
+          <a:bodyPr rtlCol="0" anchor="ctr"/>
+          <a:lstStyle/>
+          <a:p>
+            <a:pPr algn="ctr"/>
+            <a:r>
+              <a:rPr lang="en-US" altLang="ko-KR" sz="1200" dirty="0">
+                <a:latin typeface="나눔고딕" panose="020D0604000000000000" pitchFamily="50" charset="-127"/>
+                <a:ea typeface="나눔고딕" panose="020D0604000000000000" pitchFamily="50" charset="-127"/>
+              </a:rPr>
+              <a:t>Driver for IITP GDBMS</a:t>
+            </a:r>
+            <a:endParaRPr lang="ko-KR" altLang="en-US" sz="1200" dirty="0">
+              <a:latin typeface="나눔고딕" panose="020D0604000000000000" pitchFamily="50" charset="-127"/>
+              <a:ea typeface="나눔고딕" panose="020D0604000000000000" pitchFamily="50" charset="-127"/>
+            </a:endParaRPr>
+          </a:p>
+        </p:txBody>
+      </p:sp>
+      <p:cxnSp>
+        <p:nvCxnSpPr>
+          <p:cNvPr id="11" name="직선 화살표 연결선 10">
+            <a:extLst>
+              <a:ext uri="{FF2B5EF4-FFF2-40B4-BE49-F238E27FC236}">
+                <a16:creationId xmlns:a16="http://schemas.microsoft.com/office/drawing/2014/main" id="{6D0E273C-CCAF-43D7-8743-E57EE3ACA297}"/>
+              </a:ext>
+            </a:extLst>
+          </p:cNvPr>
+          <p:cNvCxnSpPr>
+            <a:stCxn id="9" idx="2"/>
+            <a:endCxn id="41" idx="0"/>
+          </p:cNvCxnSpPr>
+          <p:nvPr/>
+        </p:nvCxnSpPr>
+        <p:spPr>
+          <a:xfrm>
+            <a:off x="2227811" y="1130531"/>
+            <a:ext cx="0" cy="379613"/>
+          </a:xfrm>
+          <a:prstGeom prst="straightConnector1">
+            <a:avLst/>
+          </a:prstGeom>
+          <a:ln>
+            <a:tailEnd type="triangle"/>
+          </a:ln>
+        </p:spPr>
+        <p:style>
+          <a:lnRef idx="1">
+            <a:schemeClr val="accent1"/>
+          </a:lnRef>
+          <a:fillRef idx="0">
+            <a:schemeClr val="accent1"/>
+          </a:fillRef>
+          <a:effectRef idx="0">
+            <a:schemeClr val="accent1"/>
+          </a:effectRef>
+          <a:fontRef idx="minor">
+            <a:schemeClr val="tx1"/>
+          </a:fontRef>
+        </p:style>
+      </p:cxnSp>
+      <p:cxnSp>
+        <p:nvCxnSpPr>
+          <p:cNvPr id="17" name="직선 화살표 연결선 16">
+            <a:extLst>
+              <a:ext uri="{FF2B5EF4-FFF2-40B4-BE49-F238E27FC236}">
+                <a16:creationId xmlns:a16="http://schemas.microsoft.com/office/drawing/2014/main" id="{9EAA6C8B-D9DA-461D-A146-E42ECB94ADD4}"/>
+              </a:ext>
+            </a:extLst>
+          </p:cNvPr>
+          <p:cNvCxnSpPr>
+            <a:cxnSpLocks/>
+            <a:stCxn id="41" idx="2"/>
+            <a:endCxn id="22" idx="0"/>
+          </p:cNvCxnSpPr>
+          <p:nvPr/>
+        </p:nvCxnSpPr>
+        <p:spPr>
+          <a:xfrm>
+            <a:off x="2227811" y="2166850"/>
+            <a:ext cx="0" cy="491834"/>
+          </a:xfrm>
+          <a:prstGeom prst="straightConnector1">
+            <a:avLst/>
+          </a:prstGeom>
+          <a:ln>
+            <a:tailEnd type="triangle"/>
+          </a:ln>
+        </p:spPr>
+        <p:style>
+          <a:lnRef idx="1">
+            <a:schemeClr val="accent1"/>
+          </a:lnRef>
+          <a:fillRef idx="0">
+            <a:schemeClr val="accent1"/>
+          </a:fillRef>
+          <a:effectRef idx="0">
+            <a:schemeClr val="accent1"/>
+          </a:effectRef>
+          <a:fontRef idx="minor">
+            <a:schemeClr val="tx1"/>
+          </a:fontRef>
+        </p:style>
+      </p:cxnSp>
+      <p:sp>
+        <p:nvSpPr>
+          <p:cNvPr id="22" name="직사각형 21">
+            <a:extLst>
+              <a:ext uri="{FF2B5EF4-FFF2-40B4-BE49-F238E27FC236}">
+                <a16:creationId xmlns:a16="http://schemas.microsoft.com/office/drawing/2014/main" id="{A0E8ABD9-4903-4476-9E4A-9C6C738180B8}"/>
+              </a:ext>
+            </a:extLst>
+          </p:cNvPr>
+          <p:cNvSpPr/>
+          <p:nvPr/>
+        </p:nvSpPr>
+        <p:spPr>
+          <a:xfrm>
+            <a:off x="606829" y="2658684"/>
+            <a:ext cx="3241964" cy="656706"/>
+          </a:xfrm>
+          <a:prstGeom prst="rect">
+            <a:avLst/>
+          </a:prstGeom>
+        </p:spPr>
+        <p:style>
+          <a:lnRef idx="2">
+            <a:schemeClr val="accent1">
+              <a:shade val="50000"/>
+            </a:schemeClr>
+          </a:lnRef>
+          <a:fillRef idx="1">
+            <a:schemeClr val="accent1"/>
+          </a:fillRef>
+          <a:effectRef idx="0">
+            <a:schemeClr val="accent1"/>
+          </a:effectRef>
+          <a:fontRef idx="minor">
+            <a:schemeClr val="lt1"/>
+          </a:fontRef>
+        </p:style>
+        <p:txBody>
+          <a:bodyPr rtlCol="0" anchor="ctr"/>
+          <a:lstStyle/>
+          <a:p>
+            <a:pPr algn="ctr"/>
+            <a:r>
+              <a:rPr lang="en-US" altLang="ko-KR" sz="1200" dirty="0">
+                <a:latin typeface="나눔고딕" panose="020D0604000000000000" pitchFamily="50" charset="-127"/>
+                <a:ea typeface="나눔고딕" panose="020D0604000000000000" pitchFamily="50" charset="-127"/>
+              </a:rPr>
+              <a:t>Gephi Lib ( Graph </a:t>
+            </a:r>
+            <a:r>
+              <a:rPr lang="ko-KR" altLang="en-US" sz="1200" dirty="0">
+                <a:latin typeface="나눔고딕" panose="020D0604000000000000" pitchFamily="50" charset="-127"/>
+                <a:ea typeface="나눔고딕" panose="020D0604000000000000" pitchFamily="50" charset="-127"/>
+              </a:rPr>
+              <a:t>구조관리</a:t>
+            </a:r>
+            <a:r>
+              <a:rPr lang="en-US" altLang="ko-KR" sz="1200" dirty="0">
+                <a:latin typeface="나눔고딕" panose="020D0604000000000000" pitchFamily="50" charset="-127"/>
+                <a:ea typeface="나눔고딕" panose="020D0604000000000000" pitchFamily="50" charset="-127"/>
+              </a:rPr>
+              <a:t>)</a:t>
+            </a:r>
+          </a:p>
+          <a:p>
+            <a:pPr algn="ctr"/>
+            <a:r>
+              <a:rPr lang="en-US" altLang="ko-KR" sz="1200" dirty="0">
+                <a:latin typeface="나눔고딕" panose="020D0604000000000000" pitchFamily="50" charset="-127"/>
+                <a:ea typeface="나눔고딕" panose="020D0604000000000000" pitchFamily="50" charset="-127"/>
+              </a:rPr>
+              <a:t>+</a:t>
+            </a:r>
+          </a:p>
+          <a:p>
+            <a:pPr algn="ctr"/>
+            <a:r>
+              <a:rPr lang="en-US" altLang="ko-KR" sz="1200" dirty="0">
+                <a:latin typeface="나눔고딕" panose="020D0604000000000000" pitchFamily="50" charset="-127"/>
+                <a:ea typeface="나눔고딕" panose="020D0604000000000000" pitchFamily="50" charset="-127"/>
+              </a:rPr>
+              <a:t> UI  Lib ( Graph </a:t>
+            </a:r>
+            <a:r>
+              <a:rPr lang="ko-KR" altLang="en-US" sz="1200" dirty="0">
+                <a:latin typeface="나눔고딕" panose="020D0604000000000000" pitchFamily="50" charset="-127"/>
+                <a:ea typeface="나눔고딕" panose="020D0604000000000000" pitchFamily="50" charset="-127"/>
+              </a:rPr>
+              <a:t>표시 </a:t>
+            </a:r>
+            <a:r>
+              <a:rPr lang="en-US" altLang="ko-KR" sz="1200" dirty="0">
+                <a:latin typeface="나눔고딕" panose="020D0604000000000000" pitchFamily="50" charset="-127"/>
+                <a:ea typeface="나눔고딕" panose="020D0604000000000000" pitchFamily="50" charset="-127"/>
+              </a:rPr>
+              <a:t>)</a:t>
+            </a:r>
+            <a:endParaRPr lang="ko-KR" altLang="en-US" sz="1200" dirty="0">
+              <a:latin typeface="나눔고딕" panose="020D0604000000000000" pitchFamily="50" charset="-127"/>
+              <a:ea typeface="나눔고딕" panose="020D0604000000000000" pitchFamily="50" charset="-127"/>
+            </a:endParaRPr>
+          </a:p>
+        </p:txBody>
+      </p:sp>
+      <p:sp>
+        <p:nvSpPr>
+          <p:cNvPr id="25" name="직사각형 24">
+            <a:extLst>
+              <a:ext uri="{FF2B5EF4-FFF2-40B4-BE49-F238E27FC236}">
+                <a16:creationId xmlns:a16="http://schemas.microsoft.com/office/drawing/2014/main" id="{D2FA38D0-C28C-4D93-86A2-67D1B65F9A65}"/>
+              </a:ext>
+            </a:extLst>
+          </p:cNvPr>
+          <p:cNvSpPr/>
+          <p:nvPr/>
+        </p:nvSpPr>
+        <p:spPr>
+          <a:xfrm>
+            <a:off x="606829" y="3807224"/>
+            <a:ext cx="3241964" cy="656706"/>
+          </a:xfrm>
+          <a:prstGeom prst="rect">
+            <a:avLst/>
+          </a:prstGeom>
+        </p:spPr>
+        <p:style>
+          <a:lnRef idx="2">
+            <a:schemeClr val="accent1">
+              <a:shade val="50000"/>
+            </a:schemeClr>
+          </a:lnRef>
+          <a:fillRef idx="1">
+            <a:schemeClr val="accent1"/>
+          </a:fillRef>
+          <a:effectRef idx="0">
+            <a:schemeClr val="accent1"/>
+          </a:effectRef>
+          <a:fontRef idx="minor">
+            <a:schemeClr val="lt1"/>
+          </a:fontRef>
+        </p:style>
+        <p:txBody>
+          <a:bodyPr rtlCol="0" anchor="ctr"/>
+          <a:lstStyle/>
+          <a:p>
+            <a:pPr algn="ctr"/>
+            <a:r>
+              <a:rPr lang="ko-KR" altLang="en-US" sz="1200" dirty="0">
+                <a:latin typeface="나눔고딕" panose="020D0604000000000000" pitchFamily="50" charset="-127"/>
+                <a:ea typeface="나눔고딕" panose="020D0604000000000000" pitchFamily="50" charset="-127"/>
+              </a:rPr>
+              <a:t>시각화 뷰 결과 표시</a:t>
+            </a:r>
+          </a:p>
+        </p:txBody>
+      </p:sp>
+      <p:cxnSp>
+        <p:nvCxnSpPr>
+          <p:cNvPr id="26" name="직선 화살표 연결선 25">
+            <a:extLst>
+              <a:ext uri="{FF2B5EF4-FFF2-40B4-BE49-F238E27FC236}">
+                <a16:creationId xmlns:a16="http://schemas.microsoft.com/office/drawing/2014/main" id="{EB3A1E05-7110-4BC9-A11C-DC9A7783F753}"/>
+              </a:ext>
+            </a:extLst>
+          </p:cNvPr>
+          <p:cNvCxnSpPr>
+            <a:cxnSpLocks/>
+            <a:stCxn id="22" idx="2"/>
+            <a:endCxn id="25" idx="0"/>
+          </p:cNvCxnSpPr>
+          <p:nvPr/>
+        </p:nvCxnSpPr>
+        <p:spPr>
+          <a:xfrm>
+            <a:off x="2227811" y="3315390"/>
+            <a:ext cx="0" cy="491834"/>
+          </a:xfrm>
+          <a:prstGeom prst="straightConnector1">
+            <a:avLst/>
+          </a:prstGeom>
+          <a:ln>
+            <a:tailEnd type="triangle"/>
+          </a:ln>
+        </p:spPr>
+        <p:style>
+          <a:lnRef idx="1">
+            <a:schemeClr val="accent1"/>
+          </a:lnRef>
+          <a:fillRef idx="0">
+            <a:schemeClr val="accent1"/>
+          </a:fillRef>
+          <a:effectRef idx="0">
+            <a:schemeClr val="accent1"/>
+          </a:effectRef>
+          <a:fontRef idx="minor">
+            <a:schemeClr val="tx1"/>
+          </a:fontRef>
+        </p:style>
+      </p:cxnSp>
+    </p:spTree>
+    <p:extLst>
+      <p:ext uri="{BB962C8B-B14F-4D97-AF65-F5344CB8AC3E}">
+        <p14:creationId xmlns:p14="http://schemas.microsoft.com/office/powerpoint/2010/main" val="2174174708"/>
+      </p:ext>
+    </p:extLst>
+  </p:cSld>
+  <p:clrMapOvr>
+    <a:masterClrMapping/>
+  </p:clrMapOvr>
+</p:sld>
+</file>
+
+<file path=ppt/slides/slide5.xml><?xml version="1.0" encoding="utf-8"?>
+<p:sld xmlns:a="http://schemas.openxmlformats.org/drawingml/2006/main" xmlns:r="http://schemas.openxmlformats.org/officeDocument/2006/relationships" xmlns:p="http://schemas.openxmlformats.org/presentationml/2006/main">
+  <p:cSld>
+    <p:spTree>
+      <p:nvGrpSpPr>
+        <p:cNvPr id="1" name=""/>
+        <p:cNvGrpSpPr/>
+        <p:nvPr/>
+      </p:nvGrpSpPr>
+      <p:grpSpPr>
+        <a:xfrm>
+          <a:off x="0" y="0"/>
+          <a:ext cx="0" cy="0"/>
+          <a:chOff x="0" y="0"/>
+          <a:chExt cx="0" cy="0"/>
+        </a:xfrm>
+      </p:grpSpPr>
+      <p:pic>
+        <p:nvPicPr>
+          <p:cNvPr id="9" name="그림 8">
+            <a:extLst>
+              <a:ext uri="{FF2B5EF4-FFF2-40B4-BE49-F238E27FC236}">
+                <a16:creationId xmlns:a16="http://schemas.microsoft.com/office/drawing/2014/main" id="{86785B0A-A994-439D-8E3E-342A7689804E}"/>
+              </a:ext>
+            </a:extLst>
+          </p:cNvPr>
+          <p:cNvPicPr>
+            <a:picLocks noChangeAspect="1"/>
+          </p:cNvPicPr>
+          <p:nvPr/>
+        </p:nvPicPr>
+        <p:blipFill>
+          <a:blip r:embed="rId2"/>
+          <a:stretch>
+            <a:fillRect/>
+          </a:stretch>
+        </p:blipFill>
+        <p:spPr>
+          <a:xfrm>
+            <a:off x="1879715" y="1820398"/>
+            <a:ext cx="4076700" cy="2352675"/>
+          </a:xfrm>
+          <a:prstGeom prst="rect">
+            <a:avLst/>
+          </a:prstGeom>
+        </p:spPr>
+      </p:pic>
+      <p:pic>
+        <p:nvPicPr>
+          <p:cNvPr id="11" name="그림 10">
+            <a:extLst>
+              <a:ext uri="{FF2B5EF4-FFF2-40B4-BE49-F238E27FC236}">
+                <a16:creationId xmlns:a16="http://schemas.microsoft.com/office/drawing/2014/main" id="{8A2D4D74-5C18-4109-879A-1A2F250AC275}"/>
+              </a:ext>
+            </a:extLst>
+          </p:cNvPr>
+          <p:cNvPicPr>
+            <a:picLocks noChangeAspect="1"/>
+          </p:cNvPicPr>
+          <p:nvPr/>
+        </p:nvPicPr>
+        <p:blipFill>
+          <a:blip r:embed="rId3"/>
+          <a:stretch>
+            <a:fillRect/>
+          </a:stretch>
+        </p:blipFill>
+        <p:spPr>
+          <a:xfrm>
+            <a:off x="5884112" y="1820398"/>
+            <a:ext cx="4048125" cy="2343150"/>
+          </a:xfrm>
+          <a:prstGeom prst="rect">
+            <a:avLst/>
+          </a:prstGeom>
+        </p:spPr>
+      </p:pic>
+    </p:spTree>
+    <p:extLst>
+      <p:ext uri="{BB962C8B-B14F-4D97-AF65-F5344CB8AC3E}">
+        <p14:creationId xmlns:p14="http://schemas.microsoft.com/office/powerpoint/2010/main" val="2510863754"/>
+      </p:ext>
+    </p:extLst>
+  </p:cSld>
+  <p:clrMapOvr>
+    <a:masterClrMapping/>
+  </p:clrMapOvr>
+</p:sld>
+</file>
+
 <file path=ppt/theme/theme1.xml><?xml version="1.0" encoding="utf-8"?>
 <a:theme xmlns:a="http://schemas.openxmlformats.org/drawingml/2006/main" name="Office 테마">
   <a:themeElements>

</xml_diff>

<commit_message>
설계 스펙 변경으로 인한 요구사항 명세서 업데이트 및 타문서와 sync 작업 - Language 변경 : Gremlin -> GQL - Driver 명칭 수정 : Driver for IITP GDBMS -> Graph Driver - Table, 그림등 sync
</commit_message>
<xml_diff>
--- a/ViT_docs/문서작성용_그림원본.pptx
+++ b/ViT_docs/문서작성용_그림원본.pptx
@@ -263,7 +263,7 @@
           <a:p>
             <a:fld id="{C45A1C21-134E-40EB-8D47-CF3E42B81BA3}" type="datetimeFigureOut">
               <a:rPr lang="ko-KR" altLang="en-US" smtClean="0"/>
-              <a:t>2021-12-09</a:t>
+              <a:t>2021-12-17</a:t>
             </a:fld>
             <a:endParaRPr lang="ko-KR" altLang="en-US"/>
           </a:p>
@@ -461,7 +461,7 @@
           <a:p>
             <a:fld id="{C45A1C21-134E-40EB-8D47-CF3E42B81BA3}" type="datetimeFigureOut">
               <a:rPr lang="ko-KR" altLang="en-US" smtClean="0"/>
-              <a:t>2021-12-09</a:t>
+              <a:t>2021-12-17</a:t>
             </a:fld>
             <a:endParaRPr lang="ko-KR" altLang="en-US"/>
           </a:p>
@@ -669,7 +669,7 @@
           <a:p>
             <a:fld id="{C45A1C21-134E-40EB-8D47-CF3E42B81BA3}" type="datetimeFigureOut">
               <a:rPr lang="ko-KR" altLang="en-US" smtClean="0"/>
-              <a:t>2021-12-09</a:t>
+              <a:t>2021-12-17</a:t>
             </a:fld>
             <a:endParaRPr lang="ko-KR" altLang="en-US"/>
           </a:p>
@@ -867,7 +867,7 @@
           <a:p>
             <a:fld id="{C45A1C21-134E-40EB-8D47-CF3E42B81BA3}" type="datetimeFigureOut">
               <a:rPr lang="ko-KR" altLang="en-US" smtClean="0"/>
-              <a:t>2021-12-09</a:t>
+              <a:t>2021-12-17</a:t>
             </a:fld>
             <a:endParaRPr lang="ko-KR" altLang="en-US"/>
           </a:p>
@@ -1142,7 +1142,7 @@
           <a:p>
             <a:fld id="{C45A1C21-134E-40EB-8D47-CF3E42B81BA3}" type="datetimeFigureOut">
               <a:rPr lang="ko-KR" altLang="en-US" smtClean="0"/>
-              <a:t>2021-12-09</a:t>
+              <a:t>2021-12-17</a:t>
             </a:fld>
             <a:endParaRPr lang="ko-KR" altLang="en-US"/>
           </a:p>
@@ -1407,7 +1407,7 @@
           <a:p>
             <a:fld id="{C45A1C21-134E-40EB-8D47-CF3E42B81BA3}" type="datetimeFigureOut">
               <a:rPr lang="ko-KR" altLang="en-US" smtClean="0"/>
-              <a:t>2021-12-09</a:t>
+              <a:t>2021-12-17</a:t>
             </a:fld>
             <a:endParaRPr lang="ko-KR" altLang="en-US"/>
           </a:p>
@@ -1819,7 +1819,7 @@
           <a:p>
             <a:fld id="{C45A1C21-134E-40EB-8D47-CF3E42B81BA3}" type="datetimeFigureOut">
               <a:rPr lang="ko-KR" altLang="en-US" smtClean="0"/>
-              <a:t>2021-12-09</a:t>
+              <a:t>2021-12-17</a:t>
             </a:fld>
             <a:endParaRPr lang="ko-KR" altLang="en-US"/>
           </a:p>
@@ -1960,7 +1960,7 @@
           <a:p>
             <a:fld id="{C45A1C21-134E-40EB-8D47-CF3E42B81BA3}" type="datetimeFigureOut">
               <a:rPr lang="ko-KR" altLang="en-US" smtClean="0"/>
-              <a:t>2021-12-09</a:t>
+              <a:t>2021-12-17</a:t>
             </a:fld>
             <a:endParaRPr lang="ko-KR" altLang="en-US"/>
           </a:p>
@@ -2073,7 +2073,7 @@
           <a:p>
             <a:fld id="{C45A1C21-134E-40EB-8D47-CF3E42B81BA3}" type="datetimeFigureOut">
               <a:rPr lang="ko-KR" altLang="en-US" smtClean="0"/>
-              <a:t>2021-12-09</a:t>
+              <a:t>2021-12-17</a:t>
             </a:fld>
             <a:endParaRPr lang="ko-KR" altLang="en-US"/>
           </a:p>
@@ -2384,7 +2384,7 @@
           <a:p>
             <a:fld id="{C45A1C21-134E-40EB-8D47-CF3E42B81BA3}" type="datetimeFigureOut">
               <a:rPr lang="ko-KR" altLang="en-US" smtClean="0"/>
-              <a:t>2021-12-09</a:t>
+              <a:t>2021-12-17</a:t>
             </a:fld>
             <a:endParaRPr lang="ko-KR" altLang="en-US"/>
           </a:p>
@@ -2672,7 +2672,7 @@
           <a:p>
             <a:fld id="{C45A1C21-134E-40EB-8D47-CF3E42B81BA3}" type="datetimeFigureOut">
               <a:rPr lang="ko-KR" altLang="en-US" smtClean="0"/>
-              <a:t>2021-12-09</a:t>
+              <a:t>2021-12-17</a:t>
             </a:fld>
             <a:endParaRPr lang="ko-KR" altLang="en-US"/>
           </a:p>
@@ -2913,7 +2913,7 @@
           <a:p>
             <a:fld id="{C45A1C21-134E-40EB-8D47-CF3E42B81BA3}" type="datetimeFigureOut">
               <a:rPr lang="ko-KR" altLang="en-US" smtClean="0"/>
-              <a:t>2021-12-09</a:t>
+              <a:t>2021-12-17</a:t>
             </a:fld>
             <a:endParaRPr lang="ko-KR" altLang="en-US"/>
           </a:p>
@@ -3576,19 +3576,8 @@
                 <a:latin typeface="나눔고딕" panose="020D0604000000000000" pitchFamily="50" charset="-127"/>
                 <a:ea typeface="나눔고딕" panose="020D0604000000000000" pitchFamily="50" charset="-127"/>
               </a:rPr>
-              <a:t>                         </a:t>
-            </a:r>
-            <a:r>
-              <a:rPr lang="en-US" altLang="ko-KR" sz="1400" dirty="0" err="1">
-                <a:latin typeface="나눔고딕" panose="020D0604000000000000" pitchFamily="50" charset="-127"/>
-                <a:ea typeface="나눔고딕" panose="020D0604000000000000" pitchFamily="50" charset="-127"/>
-              </a:rPr>
-              <a:t>DBeaver</a:t>
-            </a:r>
-            <a:endParaRPr lang="en-US" altLang="ko-KR" sz="1400" dirty="0">
-              <a:latin typeface="나눔고딕" panose="020D0604000000000000" pitchFamily="50" charset="-127"/>
-              <a:ea typeface="나눔고딕" panose="020D0604000000000000" pitchFamily="50" charset="-127"/>
-            </a:endParaRPr>
+              <a:t>                         DBeaver</a:t>
+            </a:r>
           </a:p>
           <a:p>
             <a:r>
@@ -3897,7 +3886,7 @@
                 <a:latin typeface="나눔고딕" panose="020D0604000000000000" pitchFamily="50" charset="-127"/>
                 <a:ea typeface="나눔고딕" panose="020D0604000000000000" pitchFamily="50" charset="-127"/>
               </a:rPr>
-              <a:t>Driver for IITP GDBMS</a:t>
+              <a:t>Graph Driver</a:t>
             </a:r>
             <a:endParaRPr lang="ko-KR" altLang="en-US" dirty="0">
               <a:solidFill>
@@ -3982,8 +3971,8 @@
         </p:nvSpPr>
         <p:spPr>
           <a:xfrm>
-            <a:off x="819150" y="3505200"/>
-            <a:ext cx="1848267" cy="476250"/>
+            <a:off x="819150" y="3505198"/>
+            <a:ext cx="1848267" cy="476251"/>
           </a:xfrm>
           <a:prstGeom prst="roundRect">
             <a:avLst/>
@@ -4027,15 +4016,8 @@
                 <a:latin typeface="나눔고딕" panose="020D0604000000000000" pitchFamily="50" charset="-127"/>
                 <a:ea typeface="나눔고딕" panose="020D0604000000000000" pitchFamily="50" charset="-127"/>
               </a:rPr>
-              <a:t>Gremlin-Server</a:t>
-            </a:r>
-            <a:endParaRPr lang="ko-KR" altLang="en-US" sz="1400" dirty="0">
-              <a:solidFill>
-                <a:schemeClr val="bg1"/>
-              </a:solidFill>
-              <a:latin typeface="나눔고딕" panose="020D0604000000000000" pitchFamily="50" charset="-127"/>
-              <a:ea typeface="나눔고딕" panose="020D0604000000000000" pitchFamily="50" charset="-127"/>
-            </a:endParaRPr>
+              <a:t>Server for GQL</a:t>
+            </a:r>
           </a:p>
         </p:txBody>
       </p:sp>
@@ -4805,12 +4787,182 @@
           </a:p>
         </p:txBody>
       </p:sp>
-      <p:sp>
-        <p:nvSpPr>
-          <p:cNvPr id="65" name="사각형: 둥근 모서리 64">
-            <a:extLst>
-              <a:ext uri="{FF2B5EF4-FFF2-40B4-BE49-F238E27FC236}">
-                <a16:creationId xmlns:a16="http://schemas.microsoft.com/office/drawing/2014/main" id="{77381D8B-CCFE-46D5-AEF9-F61A5753F5BF}"/>
+      <p:cxnSp>
+        <p:nvCxnSpPr>
+          <p:cNvPr id="75" name="직선 화살표 연결선 74">
+            <a:extLst>
+              <a:ext uri="{FF2B5EF4-FFF2-40B4-BE49-F238E27FC236}">
+                <a16:creationId xmlns:a16="http://schemas.microsoft.com/office/drawing/2014/main" id="{3BB32568-A1BF-43AC-B71C-EB092531710E}"/>
+              </a:ext>
+            </a:extLst>
+          </p:cNvPr>
+          <p:cNvCxnSpPr>
+            <a:cxnSpLocks/>
+            <a:endCxn id="16" idx="0"/>
+          </p:cNvCxnSpPr>
+          <p:nvPr/>
+        </p:nvCxnSpPr>
+        <p:spPr>
+          <a:xfrm>
+            <a:off x="2497268" y="1543050"/>
+            <a:ext cx="0" cy="247651"/>
+          </a:xfrm>
+          <a:prstGeom prst="straightConnector1">
+            <a:avLst/>
+          </a:prstGeom>
+          <a:ln w="19050">
+            <a:tailEnd type="triangle"/>
+          </a:ln>
+        </p:spPr>
+        <p:style>
+          <a:lnRef idx="1">
+            <a:schemeClr val="accent1"/>
+          </a:lnRef>
+          <a:fillRef idx="0">
+            <a:schemeClr val="accent1"/>
+          </a:fillRef>
+          <a:effectRef idx="0">
+            <a:schemeClr val="accent1"/>
+          </a:effectRef>
+          <a:fontRef idx="minor">
+            <a:schemeClr val="tx1"/>
+          </a:fontRef>
+        </p:style>
+      </p:cxnSp>
+      <p:cxnSp>
+        <p:nvCxnSpPr>
+          <p:cNvPr id="77" name="직선 화살표 연결선 76">
+            <a:extLst>
+              <a:ext uri="{FF2B5EF4-FFF2-40B4-BE49-F238E27FC236}">
+                <a16:creationId xmlns:a16="http://schemas.microsoft.com/office/drawing/2014/main" id="{7F21CF54-C395-4F0D-8BBA-4F8B9FBE98C5}"/>
+              </a:ext>
+            </a:extLst>
+          </p:cNvPr>
+          <p:cNvCxnSpPr>
+            <a:cxnSpLocks/>
+            <a:endCxn id="19" idx="0"/>
+          </p:cNvCxnSpPr>
+          <p:nvPr/>
+        </p:nvCxnSpPr>
+        <p:spPr>
+          <a:xfrm>
+            <a:off x="1742039" y="2971801"/>
+            <a:ext cx="1245" cy="533397"/>
+          </a:xfrm>
+          <a:prstGeom prst="straightConnector1">
+            <a:avLst/>
+          </a:prstGeom>
+          <a:ln w="19050">
+            <a:tailEnd type="triangle"/>
+          </a:ln>
+        </p:spPr>
+        <p:style>
+          <a:lnRef idx="1">
+            <a:schemeClr val="accent1"/>
+          </a:lnRef>
+          <a:fillRef idx="0">
+            <a:schemeClr val="accent1"/>
+          </a:fillRef>
+          <a:effectRef idx="0">
+            <a:schemeClr val="accent1"/>
+          </a:effectRef>
+          <a:fontRef idx="minor">
+            <a:schemeClr val="tx1"/>
+          </a:fontRef>
+        </p:style>
+      </p:cxnSp>
+      <p:cxnSp>
+        <p:nvCxnSpPr>
+          <p:cNvPr id="83" name="직선 화살표 연결선 82">
+            <a:extLst>
+              <a:ext uri="{FF2B5EF4-FFF2-40B4-BE49-F238E27FC236}">
+                <a16:creationId xmlns:a16="http://schemas.microsoft.com/office/drawing/2014/main" id="{C01DA21D-EFEE-4C03-BCAA-AC9DD39822C6}"/>
+              </a:ext>
+            </a:extLst>
+          </p:cNvPr>
+          <p:cNvCxnSpPr>
+            <a:cxnSpLocks/>
+            <a:endCxn id="39" idx="0"/>
+          </p:cNvCxnSpPr>
+          <p:nvPr/>
+        </p:nvCxnSpPr>
+        <p:spPr>
+          <a:xfrm>
+            <a:off x="3522053" y="2971801"/>
+            <a:ext cx="5072" cy="533397"/>
+          </a:xfrm>
+          <a:prstGeom prst="straightConnector1">
+            <a:avLst/>
+          </a:prstGeom>
+          <a:ln>
+            <a:prstDash val="sysDot"/>
+            <a:tailEnd type="triangle"/>
+          </a:ln>
+        </p:spPr>
+        <p:style>
+          <a:lnRef idx="1">
+            <a:schemeClr val="accent1"/>
+          </a:lnRef>
+          <a:fillRef idx="0">
+            <a:schemeClr val="accent1"/>
+          </a:fillRef>
+          <a:effectRef idx="0">
+            <a:schemeClr val="accent1"/>
+          </a:effectRef>
+          <a:fontRef idx="minor">
+            <a:schemeClr val="tx1"/>
+          </a:fontRef>
+        </p:style>
+      </p:cxnSp>
+      <p:cxnSp>
+        <p:nvCxnSpPr>
+          <p:cNvPr id="86" name="직선 화살표 연결선 85">
+            <a:extLst>
+              <a:ext uri="{FF2B5EF4-FFF2-40B4-BE49-F238E27FC236}">
+                <a16:creationId xmlns:a16="http://schemas.microsoft.com/office/drawing/2014/main" id="{9ED7E41C-7EAB-47E5-B137-A476A5807E33}"/>
+              </a:ext>
+            </a:extLst>
+          </p:cNvPr>
+          <p:cNvCxnSpPr>
+            <a:cxnSpLocks/>
+            <a:stCxn id="19" idx="2"/>
+            <a:endCxn id="21" idx="0"/>
+          </p:cNvCxnSpPr>
+          <p:nvPr/>
+        </p:nvCxnSpPr>
+        <p:spPr>
+          <a:xfrm flipH="1">
+            <a:off x="1742039" y="3981449"/>
+            <a:ext cx="1245" cy="485774"/>
+          </a:xfrm>
+          <a:prstGeom prst="straightConnector1">
+            <a:avLst/>
+          </a:prstGeom>
+          <a:ln w="19050">
+            <a:tailEnd type="triangle"/>
+          </a:ln>
+        </p:spPr>
+        <p:style>
+          <a:lnRef idx="1">
+            <a:schemeClr val="accent1"/>
+          </a:lnRef>
+          <a:fillRef idx="0">
+            <a:schemeClr val="accent1"/>
+          </a:fillRef>
+          <a:effectRef idx="0">
+            <a:schemeClr val="accent1"/>
+          </a:effectRef>
+          <a:fontRef idx="minor">
+            <a:schemeClr val="tx1"/>
+          </a:fontRef>
+        </p:style>
+      </p:cxnSp>
+      <p:sp>
+        <p:nvSpPr>
+          <p:cNvPr id="94" name="직사각형 93">
+            <a:extLst>
+              <a:ext uri="{FF2B5EF4-FFF2-40B4-BE49-F238E27FC236}">
+                <a16:creationId xmlns:a16="http://schemas.microsoft.com/office/drawing/2014/main" id="{EE90BE80-ED93-4DBA-8D5C-945CD9999085}"/>
               </a:ext>
             </a:extLst>
           </p:cNvPr>
@@ -4819,8 +4971,69 @@
         </p:nvSpPr>
         <p:spPr>
           <a:xfrm>
-            <a:off x="819151" y="4543428"/>
-            <a:ext cx="1853965" cy="314320"/>
+            <a:off x="2828925" y="4457697"/>
+            <a:ext cx="1407266" cy="895350"/>
+          </a:xfrm>
+          <a:prstGeom prst="rect">
+            <a:avLst/>
+          </a:prstGeom>
+          <a:noFill/>
+          <a:ln w="25400">
+            <a:solidFill>
+              <a:schemeClr val="bg1">
+                <a:lumMod val="50000"/>
+              </a:schemeClr>
+            </a:solidFill>
+            <a:prstDash val="sysDash"/>
+          </a:ln>
+        </p:spPr>
+        <p:style>
+          <a:lnRef idx="2">
+            <a:schemeClr val="accent1">
+              <a:shade val="50000"/>
+            </a:schemeClr>
+          </a:lnRef>
+          <a:fillRef idx="1">
+            <a:schemeClr val="accent1"/>
+          </a:fillRef>
+          <a:effectRef idx="0">
+            <a:schemeClr val="accent1"/>
+          </a:effectRef>
+          <a:fontRef idx="minor">
+            <a:schemeClr val="lt1"/>
+          </a:fontRef>
+        </p:style>
+        <p:txBody>
+          <a:bodyPr rtlCol="0" anchor="ctr"/>
+          <a:lstStyle/>
+          <a:p>
+            <a:pPr algn="ctr"/>
+            <a:endParaRPr lang="en-US" altLang="ko-KR" dirty="0">
+              <a:solidFill>
+                <a:schemeClr val="tx1"/>
+              </a:solidFill>
+              <a:latin typeface="나눔고딕" panose="020D0604000000000000" pitchFamily="50" charset="-127"/>
+              <a:ea typeface="나눔고딕" panose="020D0604000000000000" pitchFamily="50" charset="-127"/>
+            </a:endParaRPr>
+          </a:p>
+        </p:txBody>
+      </p:sp>
+      <p:sp>
+        <p:nvSpPr>
+          <p:cNvPr id="95" name="사각형: 둥근 모서리 94">
+            <a:extLst>
+              <a:ext uri="{FF2B5EF4-FFF2-40B4-BE49-F238E27FC236}">
+                <a16:creationId xmlns:a16="http://schemas.microsoft.com/office/drawing/2014/main" id="{90407FF8-2D0A-40EC-8355-2103D7A7E888}"/>
+              </a:ext>
+            </a:extLst>
+          </p:cNvPr>
+          <p:cNvSpPr/>
+          <p:nvPr/>
+        </p:nvSpPr>
+        <p:spPr>
+          <a:xfrm>
+            <a:off x="819150" y="4718749"/>
+            <a:ext cx="1853965" cy="434278"/>
           </a:xfrm>
           <a:prstGeom prst="roundRect">
             <a:avLst/>
@@ -4864,319 +5077,7 @@
                 <a:latin typeface="나눔고딕" panose="020D0604000000000000" pitchFamily="50" charset="-127"/>
                 <a:ea typeface="나눔고딕" panose="020D0604000000000000" pitchFamily="50" charset="-127"/>
               </a:rPr>
-              <a:t>Janus Graph</a:t>
-            </a:r>
-            <a:endParaRPr lang="ko-KR" altLang="en-US" sz="1400" dirty="0">
-              <a:solidFill>
-                <a:schemeClr val="bg1"/>
-              </a:solidFill>
-              <a:latin typeface="나눔고딕" panose="020D0604000000000000" pitchFamily="50" charset="-127"/>
-              <a:ea typeface="나눔고딕" panose="020D0604000000000000" pitchFamily="50" charset="-127"/>
-            </a:endParaRPr>
-          </a:p>
-        </p:txBody>
-      </p:sp>
-      <p:cxnSp>
-        <p:nvCxnSpPr>
-          <p:cNvPr id="75" name="직선 화살표 연결선 74">
-            <a:extLst>
-              <a:ext uri="{FF2B5EF4-FFF2-40B4-BE49-F238E27FC236}">
-                <a16:creationId xmlns:a16="http://schemas.microsoft.com/office/drawing/2014/main" id="{3BB32568-A1BF-43AC-B71C-EB092531710E}"/>
-              </a:ext>
-            </a:extLst>
-          </p:cNvPr>
-          <p:cNvCxnSpPr>
-            <a:cxnSpLocks/>
-            <a:endCxn id="16" idx="0"/>
-          </p:cNvCxnSpPr>
-          <p:nvPr/>
-        </p:nvCxnSpPr>
-        <p:spPr>
-          <a:xfrm>
-            <a:off x="2497268" y="1543050"/>
-            <a:ext cx="0" cy="247651"/>
-          </a:xfrm>
-          <a:prstGeom prst="straightConnector1">
-            <a:avLst/>
-          </a:prstGeom>
-          <a:ln w="19050">
-            <a:tailEnd type="triangle"/>
-          </a:ln>
-        </p:spPr>
-        <p:style>
-          <a:lnRef idx="1">
-            <a:schemeClr val="accent1"/>
-          </a:lnRef>
-          <a:fillRef idx="0">
-            <a:schemeClr val="accent1"/>
-          </a:fillRef>
-          <a:effectRef idx="0">
-            <a:schemeClr val="accent1"/>
-          </a:effectRef>
-          <a:fontRef idx="minor">
-            <a:schemeClr val="tx1"/>
-          </a:fontRef>
-        </p:style>
-      </p:cxnSp>
-      <p:cxnSp>
-        <p:nvCxnSpPr>
-          <p:cNvPr id="77" name="직선 화살표 연결선 76">
-            <a:extLst>
-              <a:ext uri="{FF2B5EF4-FFF2-40B4-BE49-F238E27FC236}">
-                <a16:creationId xmlns:a16="http://schemas.microsoft.com/office/drawing/2014/main" id="{7F21CF54-C395-4F0D-8BBA-4F8B9FBE98C5}"/>
-              </a:ext>
-            </a:extLst>
-          </p:cNvPr>
-          <p:cNvCxnSpPr>
-            <a:cxnSpLocks/>
-            <a:endCxn id="19" idx="0"/>
-          </p:cNvCxnSpPr>
-          <p:nvPr/>
-        </p:nvCxnSpPr>
-        <p:spPr>
-          <a:xfrm>
-            <a:off x="1742039" y="2971801"/>
-            <a:ext cx="1245" cy="533399"/>
-          </a:xfrm>
-          <a:prstGeom prst="straightConnector1">
-            <a:avLst/>
-          </a:prstGeom>
-          <a:ln w="19050">
-            <a:tailEnd type="triangle"/>
-          </a:ln>
-        </p:spPr>
-        <p:style>
-          <a:lnRef idx="1">
-            <a:schemeClr val="accent1"/>
-          </a:lnRef>
-          <a:fillRef idx="0">
-            <a:schemeClr val="accent1"/>
-          </a:fillRef>
-          <a:effectRef idx="0">
-            <a:schemeClr val="accent1"/>
-          </a:effectRef>
-          <a:fontRef idx="minor">
-            <a:schemeClr val="tx1"/>
-          </a:fontRef>
-        </p:style>
-      </p:cxnSp>
-      <p:cxnSp>
-        <p:nvCxnSpPr>
-          <p:cNvPr id="83" name="직선 화살표 연결선 82">
-            <a:extLst>
-              <a:ext uri="{FF2B5EF4-FFF2-40B4-BE49-F238E27FC236}">
-                <a16:creationId xmlns:a16="http://schemas.microsoft.com/office/drawing/2014/main" id="{C01DA21D-EFEE-4C03-BCAA-AC9DD39822C6}"/>
-              </a:ext>
-            </a:extLst>
-          </p:cNvPr>
-          <p:cNvCxnSpPr>
-            <a:cxnSpLocks/>
-            <a:endCxn id="39" idx="0"/>
-          </p:cNvCxnSpPr>
-          <p:nvPr/>
-        </p:nvCxnSpPr>
-        <p:spPr>
-          <a:xfrm>
-            <a:off x="3522053" y="2971801"/>
-            <a:ext cx="5072" cy="533397"/>
-          </a:xfrm>
-          <a:prstGeom prst="straightConnector1">
-            <a:avLst/>
-          </a:prstGeom>
-          <a:ln>
-            <a:prstDash val="sysDot"/>
-            <a:tailEnd type="triangle"/>
-          </a:ln>
-        </p:spPr>
-        <p:style>
-          <a:lnRef idx="1">
-            <a:schemeClr val="accent1"/>
-          </a:lnRef>
-          <a:fillRef idx="0">
-            <a:schemeClr val="accent1"/>
-          </a:fillRef>
-          <a:effectRef idx="0">
-            <a:schemeClr val="accent1"/>
-          </a:effectRef>
-          <a:fontRef idx="minor">
-            <a:schemeClr val="tx1"/>
-          </a:fontRef>
-        </p:style>
-      </p:cxnSp>
-      <p:cxnSp>
-        <p:nvCxnSpPr>
-          <p:cNvPr id="86" name="직선 화살표 연결선 85">
-            <a:extLst>
-              <a:ext uri="{FF2B5EF4-FFF2-40B4-BE49-F238E27FC236}">
-                <a16:creationId xmlns:a16="http://schemas.microsoft.com/office/drawing/2014/main" id="{9ED7E41C-7EAB-47E5-B137-A476A5807E33}"/>
-              </a:ext>
-            </a:extLst>
-          </p:cNvPr>
-          <p:cNvCxnSpPr>
-            <a:cxnSpLocks/>
-            <a:stCxn id="19" idx="2"/>
-            <a:endCxn id="21" idx="0"/>
-          </p:cNvCxnSpPr>
-          <p:nvPr/>
-        </p:nvCxnSpPr>
-        <p:spPr>
-          <a:xfrm flipH="1">
-            <a:off x="1742039" y="3981450"/>
-            <a:ext cx="1245" cy="485773"/>
-          </a:xfrm>
-          <a:prstGeom prst="straightConnector1">
-            <a:avLst/>
-          </a:prstGeom>
-          <a:ln w="19050">
-            <a:tailEnd type="triangle"/>
-          </a:ln>
-        </p:spPr>
-        <p:style>
-          <a:lnRef idx="1">
-            <a:schemeClr val="accent1"/>
-          </a:lnRef>
-          <a:fillRef idx="0">
-            <a:schemeClr val="accent1"/>
-          </a:fillRef>
-          <a:effectRef idx="0">
-            <a:schemeClr val="accent1"/>
-          </a:effectRef>
-          <a:fontRef idx="minor">
-            <a:schemeClr val="tx1"/>
-          </a:fontRef>
-        </p:style>
-      </p:cxnSp>
-      <p:sp>
-        <p:nvSpPr>
-          <p:cNvPr id="94" name="직사각형 93">
-            <a:extLst>
-              <a:ext uri="{FF2B5EF4-FFF2-40B4-BE49-F238E27FC236}">
-                <a16:creationId xmlns:a16="http://schemas.microsoft.com/office/drawing/2014/main" id="{EE90BE80-ED93-4DBA-8D5C-945CD9999085}"/>
-              </a:ext>
-            </a:extLst>
-          </p:cNvPr>
-          <p:cNvSpPr/>
-          <p:nvPr/>
-        </p:nvSpPr>
-        <p:spPr>
-          <a:xfrm>
-            <a:off x="2828925" y="4457697"/>
-            <a:ext cx="1407266" cy="895350"/>
-          </a:xfrm>
-          <a:prstGeom prst="rect">
-            <a:avLst/>
-          </a:prstGeom>
-          <a:noFill/>
-          <a:ln w="25400">
-            <a:solidFill>
-              <a:schemeClr val="bg1">
-                <a:lumMod val="50000"/>
-              </a:schemeClr>
-            </a:solidFill>
-            <a:prstDash val="sysDash"/>
-          </a:ln>
-        </p:spPr>
-        <p:style>
-          <a:lnRef idx="2">
-            <a:schemeClr val="accent1">
-              <a:shade val="50000"/>
-            </a:schemeClr>
-          </a:lnRef>
-          <a:fillRef idx="1">
-            <a:schemeClr val="accent1"/>
-          </a:fillRef>
-          <a:effectRef idx="0">
-            <a:schemeClr val="accent1"/>
-          </a:effectRef>
-          <a:fontRef idx="minor">
-            <a:schemeClr val="lt1"/>
-          </a:fontRef>
-        </p:style>
-        <p:txBody>
-          <a:bodyPr rtlCol="0" anchor="ctr"/>
-          <a:lstStyle/>
-          <a:p>
-            <a:pPr algn="ctr"/>
-            <a:endParaRPr lang="en-US" altLang="ko-KR" dirty="0">
-              <a:solidFill>
-                <a:schemeClr val="tx1"/>
-              </a:solidFill>
-              <a:latin typeface="나눔고딕" panose="020D0604000000000000" pitchFamily="50" charset="-127"/>
-              <a:ea typeface="나눔고딕" panose="020D0604000000000000" pitchFamily="50" charset="-127"/>
-            </a:endParaRPr>
-          </a:p>
-        </p:txBody>
-      </p:sp>
-      <p:sp>
-        <p:nvSpPr>
-          <p:cNvPr id="95" name="사각형: 둥근 모서리 94">
-            <a:extLst>
-              <a:ext uri="{FF2B5EF4-FFF2-40B4-BE49-F238E27FC236}">
-                <a16:creationId xmlns:a16="http://schemas.microsoft.com/office/drawing/2014/main" id="{90407FF8-2D0A-40EC-8355-2103D7A7E888}"/>
-              </a:ext>
-            </a:extLst>
-          </p:cNvPr>
-          <p:cNvSpPr/>
-          <p:nvPr/>
-        </p:nvSpPr>
-        <p:spPr>
-          <a:xfrm>
-            <a:off x="819151" y="4953008"/>
-            <a:ext cx="1853965" cy="314319"/>
-          </a:xfrm>
-          <a:prstGeom prst="roundRect">
-            <a:avLst/>
-          </a:prstGeom>
-          <a:solidFill>
-            <a:srgbClr val="00B050"/>
-          </a:solidFill>
-          <a:ln w="25400">
-            <a:solidFill>
-              <a:schemeClr val="accent6"/>
-            </a:solidFill>
-            <a:prstDash val="solid"/>
-          </a:ln>
-        </p:spPr>
-        <p:style>
-          <a:lnRef idx="2">
-            <a:schemeClr val="accent6">
-              <a:shade val="50000"/>
-            </a:schemeClr>
-          </a:lnRef>
-          <a:fillRef idx="1">
-            <a:schemeClr val="accent6"/>
-          </a:fillRef>
-          <a:effectRef idx="0">
-            <a:schemeClr val="accent6"/>
-          </a:effectRef>
-          <a:fontRef idx="minor">
-            <a:schemeClr val="lt1"/>
-          </a:fontRef>
-        </p:style>
-        <p:txBody>
-          <a:bodyPr rtlCol="0" anchor="ctr"/>
-          <a:lstStyle/>
-          <a:p>
-            <a:pPr algn="ctr"/>
-            <a:r>
-              <a:rPr lang="en-US" altLang="ko-KR" sz="1400" dirty="0" err="1">
-                <a:solidFill>
-                  <a:schemeClr val="bg1"/>
-                </a:solidFill>
-                <a:latin typeface="나눔고딕" panose="020D0604000000000000" pitchFamily="50" charset="-127"/>
-                <a:ea typeface="나눔고딕" panose="020D0604000000000000" pitchFamily="50" charset="-127"/>
-              </a:rPr>
-              <a:t>TurboGraph</a:t>
-            </a:r>
-            <a:r>
-              <a:rPr lang="en-US" altLang="ko-KR" sz="1400" dirty="0">
-                <a:solidFill>
-                  <a:schemeClr val="bg1"/>
-                </a:solidFill>
-                <a:latin typeface="나눔고딕" panose="020D0604000000000000" pitchFamily="50" charset="-127"/>
-                <a:ea typeface="나눔고딕" panose="020D0604000000000000" pitchFamily="50" charset="-127"/>
-              </a:rPr>
-              <a:t>++</a:t>
+              <a:t>TurboGraph++</a:t>
             </a:r>
             <a:endParaRPr lang="ko-KR" altLang="en-US" sz="1400" dirty="0">
               <a:solidFill>

</xml_diff>

<commit_message>
[GT-46] Manual 작성 http://jira.iitp.cubrid.org/browse/GT-46
- 기본 index 파일 수정
- 소개 페이지 적용
- 스펙 변경된 문서 내용 수정
</commit_message>
<xml_diff>
--- a/ViT_docs/문서작성용_그림원본.pptx
+++ b/ViT_docs/문서작성용_그림원본.pptx
@@ -263,7 +263,7 @@
           <a:p>
             <a:fld id="{C45A1C21-134E-40EB-8D47-CF3E42B81BA3}" type="datetimeFigureOut">
               <a:rPr lang="ko-KR" altLang="en-US" smtClean="0"/>
-              <a:t>2021-12-17</a:t>
+              <a:t>2022-12-09</a:t>
             </a:fld>
             <a:endParaRPr lang="ko-KR" altLang="en-US"/>
           </a:p>
@@ -461,7 +461,7 @@
           <a:p>
             <a:fld id="{C45A1C21-134E-40EB-8D47-CF3E42B81BA3}" type="datetimeFigureOut">
               <a:rPr lang="ko-KR" altLang="en-US" smtClean="0"/>
-              <a:t>2021-12-17</a:t>
+              <a:t>2022-12-09</a:t>
             </a:fld>
             <a:endParaRPr lang="ko-KR" altLang="en-US"/>
           </a:p>
@@ -669,7 +669,7 @@
           <a:p>
             <a:fld id="{C45A1C21-134E-40EB-8D47-CF3E42B81BA3}" type="datetimeFigureOut">
               <a:rPr lang="ko-KR" altLang="en-US" smtClean="0"/>
-              <a:t>2021-12-17</a:t>
+              <a:t>2022-12-09</a:t>
             </a:fld>
             <a:endParaRPr lang="ko-KR" altLang="en-US"/>
           </a:p>
@@ -867,7 +867,7 @@
           <a:p>
             <a:fld id="{C45A1C21-134E-40EB-8D47-CF3E42B81BA3}" type="datetimeFigureOut">
               <a:rPr lang="ko-KR" altLang="en-US" smtClean="0"/>
-              <a:t>2021-12-17</a:t>
+              <a:t>2022-12-09</a:t>
             </a:fld>
             <a:endParaRPr lang="ko-KR" altLang="en-US"/>
           </a:p>
@@ -1142,7 +1142,7 @@
           <a:p>
             <a:fld id="{C45A1C21-134E-40EB-8D47-CF3E42B81BA3}" type="datetimeFigureOut">
               <a:rPr lang="ko-KR" altLang="en-US" smtClean="0"/>
-              <a:t>2021-12-17</a:t>
+              <a:t>2022-12-09</a:t>
             </a:fld>
             <a:endParaRPr lang="ko-KR" altLang="en-US"/>
           </a:p>
@@ -1407,7 +1407,7 @@
           <a:p>
             <a:fld id="{C45A1C21-134E-40EB-8D47-CF3E42B81BA3}" type="datetimeFigureOut">
               <a:rPr lang="ko-KR" altLang="en-US" smtClean="0"/>
-              <a:t>2021-12-17</a:t>
+              <a:t>2022-12-09</a:t>
             </a:fld>
             <a:endParaRPr lang="ko-KR" altLang="en-US"/>
           </a:p>
@@ -1819,7 +1819,7 @@
           <a:p>
             <a:fld id="{C45A1C21-134E-40EB-8D47-CF3E42B81BA3}" type="datetimeFigureOut">
               <a:rPr lang="ko-KR" altLang="en-US" smtClean="0"/>
-              <a:t>2021-12-17</a:t>
+              <a:t>2022-12-09</a:t>
             </a:fld>
             <a:endParaRPr lang="ko-KR" altLang="en-US"/>
           </a:p>
@@ -1960,7 +1960,7 @@
           <a:p>
             <a:fld id="{C45A1C21-134E-40EB-8D47-CF3E42B81BA3}" type="datetimeFigureOut">
               <a:rPr lang="ko-KR" altLang="en-US" smtClean="0"/>
-              <a:t>2021-12-17</a:t>
+              <a:t>2022-12-09</a:t>
             </a:fld>
             <a:endParaRPr lang="ko-KR" altLang="en-US"/>
           </a:p>
@@ -2073,7 +2073,7 @@
           <a:p>
             <a:fld id="{C45A1C21-134E-40EB-8D47-CF3E42B81BA3}" type="datetimeFigureOut">
               <a:rPr lang="ko-KR" altLang="en-US" smtClean="0"/>
-              <a:t>2021-12-17</a:t>
+              <a:t>2022-12-09</a:t>
             </a:fld>
             <a:endParaRPr lang="ko-KR" altLang="en-US"/>
           </a:p>
@@ -2384,7 +2384,7 @@
           <a:p>
             <a:fld id="{C45A1C21-134E-40EB-8D47-CF3E42B81BA3}" type="datetimeFigureOut">
               <a:rPr lang="ko-KR" altLang="en-US" smtClean="0"/>
-              <a:t>2021-12-17</a:t>
+              <a:t>2022-12-09</a:t>
             </a:fld>
             <a:endParaRPr lang="ko-KR" altLang="en-US"/>
           </a:p>
@@ -2672,7 +2672,7 @@
           <a:p>
             <a:fld id="{C45A1C21-134E-40EB-8D47-CF3E42B81BA3}" type="datetimeFigureOut">
               <a:rPr lang="ko-KR" altLang="en-US" smtClean="0"/>
-              <a:t>2021-12-17</a:t>
+              <a:t>2022-12-09</a:t>
             </a:fld>
             <a:endParaRPr lang="ko-KR" altLang="en-US"/>
           </a:p>
@@ -2913,7 +2913,7 @@
           <a:p>
             <a:fld id="{C45A1C21-134E-40EB-8D47-CF3E42B81BA3}" type="datetimeFigureOut">
               <a:rPr lang="ko-KR" altLang="en-US" smtClean="0"/>
-              <a:t>2021-12-17</a:t>
+              <a:t>2022-12-09</a:t>
             </a:fld>
             <a:endParaRPr lang="ko-KR" altLang="en-US"/>
           </a:p>
@@ -3649,7 +3649,7 @@
                 <a:latin typeface="나눔고딕" panose="020D0604000000000000" pitchFamily="50" charset="-127"/>
                 <a:ea typeface="나눔고딕" panose="020D0604000000000000" pitchFamily="50" charset="-127"/>
               </a:rPr>
-              <a:t>Gephi Library</a:t>
+              <a:t>Gephi Library + JAVAFX</a:t>
             </a:r>
             <a:endParaRPr lang="ko-KR" altLang="en-US" sz="1100" dirty="0">
               <a:latin typeface="나눔고딕" panose="020D0604000000000000" pitchFamily="50" charset="-127"/>
@@ -3886,7 +3886,7 @@
                 <a:latin typeface="나눔고딕" panose="020D0604000000000000" pitchFamily="50" charset="-127"/>
                 <a:ea typeface="나눔고딕" panose="020D0604000000000000" pitchFamily="50" charset="-127"/>
               </a:rPr>
-              <a:t>Graph Driver</a:t>
+              <a:t>JDBC Driver For TurboGraph++</a:t>
             </a:r>
             <a:endParaRPr lang="ko-KR" altLang="en-US" dirty="0">
               <a:solidFill>

</xml_diff>

<commit_message>
[GT-46] Manual 작성 (#54)
http://jira.iitp.cubrid.org/browse/GT-46

- 기본 index 파일 수정
- 소개 페이지 적용
- 스펙 변경된 문서 내용 수정
</commit_message>
<xml_diff>
--- a/ViT_docs/문서작성용_그림원본.pptx
+++ b/ViT_docs/문서작성용_그림원본.pptx
@@ -263,7 +263,7 @@
           <a:p>
             <a:fld id="{C45A1C21-134E-40EB-8D47-CF3E42B81BA3}" type="datetimeFigureOut">
               <a:rPr lang="ko-KR" altLang="en-US" smtClean="0"/>
-              <a:t>2021-12-17</a:t>
+              <a:t>2022-12-09</a:t>
             </a:fld>
             <a:endParaRPr lang="ko-KR" altLang="en-US"/>
           </a:p>
@@ -461,7 +461,7 @@
           <a:p>
             <a:fld id="{C45A1C21-134E-40EB-8D47-CF3E42B81BA3}" type="datetimeFigureOut">
               <a:rPr lang="ko-KR" altLang="en-US" smtClean="0"/>
-              <a:t>2021-12-17</a:t>
+              <a:t>2022-12-09</a:t>
             </a:fld>
             <a:endParaRPr lang="ko-KR" altLang="en-US"/>
           </a:p>
@@ -669,7 +669,7 @@
           <a:p>
             <a:fld id="{C45A1C21-134E-40EB-8D47-CF3E42B81BA3}" type="datetimeFigureOut">
               <a:rPr lang="ko-KR" altLang="en-US" smtClean="0"/>
-              <a:t>2021-12-17</a:t>
+              <a:t>2022-12-09</a:t>
             </a:fld>
             <a:endParaRPr lang="ko-KR" altLang="en-US"/>
           </a:p>
@@ -867,7 +867,7 @@
           <a:p>
             <a:fld id="{C45A1C21-134E-40EB-8D47-CF3E42B81BA3}" type="datetimeFigureOut">
               <a:rPr lang="ko-KR" altLang="en-US" smtClean="0"/>
-              <a:t>2021-12-17</a:t>
+              <a:t>2022-12-09</a:t>
             </a:fld>
             <a:endParaRPr lang="ko-KR" altLang="en-US"/>
           </a:p>
@@ -1142,7 +1142,7 @@
           <a:p>
             <a:fld id="{C45A1C21-134E-40EB-8D47-CF3E42B81BA3}" type="datetimeFigureOut">
               <a:rPr lang="ko-KR" altLang="en-US" smtClean="0"/>
-              <a:t>2021-12-17</a:t>
+              <a:t>2022-12-09</a:t>
             </a:fld>
             <a:endParaRPr lang="ko-KR" altLang="en-US"/>
           </a:p>
@@ -1407,7 +1407,7 @@
           <a:p>
             <a:fld id="{C45A1C21-134E-40EB-8D47-CF3E42B81BA3}" type="datetimeFigureOut">
               <a:rPr lang="ko-KR" altLang="en-US" smtClean="0"/>
-              <a:t>2021-12-17</a:t>
+              <a:t>2022-12-09</a:t>
             </a:fld>
             <a:endParaRPr lang="ko-KR" altLang="en-US"/>
           </a:p>
@@ -1819,7 +1819,7 @@
           <a:p>
             <a:fld id="{C45A1C21-134E-40EB-8D47-CF3E42B81BA3}" type="datetimeFigureOut">
               <a:rPr lang="ko-KR" altLang="en-US" smtClean="0"/>
-              <a:t>2021-12-17</a:t>
+              <a:t>2022-12-09</a:t>
             </a:fld>
             <a:endParaRPr lang="ko-KR" altLang="en-US"/>
           </a:p>
@@ -1960,7 +1960,7 @@
           <a:p>
             <a:fld id="{C45A1C21-134E-40EB-8D47-CF3E42B81BA3}" type="datetimeFigureOut">
               <a:rPr lang="ko-KR" altLang="en-US" smtClean="0"/>
-              <a:t>2021-12-17</a:t>
+              <a:t>2022-12-09</a:t>
             </a:fld>
             <a:endParaRPr lang="ko-KR" altLang="en-US"/>
           </a:p>
@@ -2073,7 +2073,7 @@
           <a:p>
             <a:fld id="{C45A1C21-134E-40EB-8D47-CF3E42B81BA3}" type="datetimeFigureOut">
               <a:rPr lang="ko-KR" altLang="en-US" smtClean="0"/>
-              <a:t>2021-12-17</a:t>
+              <a:t>2022-12-09</a:t>
             </a:fld>
             <a:endParaRPr lang="ko-KR" altLang="en-US"/>
           </a:p>
@@ -2384,7 +2384,7 @@
           <a:p>
             <a:fld id="{C45A1C21-134E-40EB-8D47-CF3E42B81BA3}" type="datetimeFigureOut">
               <a:rPr lang="ko-KR" altLang="en-US" smtClean="0"/>
-              <a:t>2021-12-17</a:t>
+              <a:t>2022-12-09</a:t>
             </a:fld>
             <a:endParaRPr lang="ko-KR" altLang="en-US"/>
           </a:p>
@@ -2672,7 +2672,7 @@
           <a:p>
             <a:fld id="{C45A1C21-134E-40EB-8D47-CF3E42B81BA3}" type="datetimeFigureOut">
               <a:rPr lang="ko-KR" altLang="en-US" smtClean="0"/>
-              <a:t>2021-12-17</a:t>
+              <a:t>2022-12-09</a:t>
             </a:fld>
             <a:endParaRPr lang="ko-KR" altLang="en-US"/>
           </a:p>
@@ -2913,7 +2913,7 @@
           <a:p>
             <a:fld id="{C45A1C21-134E-40EB-8D47-CF3E42B81BA3}" type="datetimeFigureOut">
               <a:rPr lang="ko-KR" altLang="en-US" smtClean="0"/>
-              <a:t>2021-12-17</a:t>
+              <a:t>2022-12-09</a:t>
             </a:fld>
             <a:endParaRPr lang="ko-KR" altLang="en-US"/>
           </a:p>
@@ -3649,7 +3649,7 @@
                 <a:latin typeface="나눔고딕" panose="020D0604000000000000" pitchFamily="50" charset="-127"/>
                 <a:ea typeface="나눔고딕" panose="020D0604000000000000" pitchFamily="50" charset="-127"/>
               </a:rPr>
-              <a:t>Gephi Library</a:t>
+              <a:t>Gephi Library + JAVAFX</a:t>
             </a:r>
             <a:endParaRPr lang="ko-KR" altLang="en-US" sz="1100" dirty="0">
               <a:latin typeface="나눔고딕" panose="020D0604000000000000" pitchFamily="50" charset="-127"/>
@@ -3886,7 +3886,7 @@
                 <a:latin typeface="나눔고딕" panose="020D0604000000000000" pitchFamily="50" charset="-127"/>
                 <a:ea typeface="나눔고딕" panose="020D0604000000000000" pitchFamily="50" charset="-127"/>
               </a:rPr>
-              <a:t>Graph Driver</a:t>
+              <a:t>JDBC Driver For TurboGraph++</a:t>
             </a:r>
             <a:endParaRPr lang="ko-KR" altLang="en-US" dirty="0">
               <a:solidFill>

</xml_diff>